<commit_message>
SVN 6431: Update admin tools powerpoint, fix typo in admin page.
</commit_message>
<xml_diff>
--- a/Private/MyFlightbook Admin Tools.pptx
+++ b/Private/MyFlightbook Admin Tools.pptx
@@ -31,24 +31,24 @@
     <p:sldId id="262" r:id="rId19"/>
     <p:sldId id="265" r:id="rId20"/>
     <p:sldId id="293" r:id="rId21"/>
-    <p:sldId id="294" r:id="rId22"/>
-    <p:sldId id="280" r:id="rId23"/>
-    <p:sldId id="282" r:id="rId24"/>
-    <p:sldId id="283" r:id="rId25"/>
-    <p:sldId id="295" r:id="rId26"/>
-    <p:sldId id="296" r:id="rId27"/>
-    <p:sldId id="297" r:id="rId28"/>
-    <p:sldId id="268" r:id="rId29"/>
-    <p:sldId id="279" r:id="rId30"/>
-    <p:sldId id="298" r:id="rId31"/>
-    <p:sldId id="300" r:id="rId32"/>
-    <p:sldId id="301" r:id="rId33"/>
-    <p:sldId id="274" r:id="rId34"/>
-    <p:sldId id="299" r:id="rId35"/>
-    <p:sldId id="269" r:id="rId36"/>
-    <p:sldId id="286" r:id="rId37"/>
-    <p:sldId id="270" r:id="rId38"/>
-    <p:sldId id="290" r:id="rId39"/>
+    <p:sldId id="302" r:id="rId22"/>
+    <p:sldId id="294" r:id="rId23"/>
+    <p:sldId id="280" r:id="rId24"/>
+    <p:sldId id="282" r:id="rId25"/>
+    <p:sldId id="283" r:id="rId26"/>
+    <p:sldId id="295" r:id="rId27"/>
+    <p:sldId id="296" r:id="rId28"/>
+    <p:sldId id="297" r:id="rId29"/>
+    <p:sldId id="268" r:id="rId30"/>
+    <p:sldId id="279" r:id="rId31"/>
+    <p:sldId id="298" r:id="rId32"/>
+    <p:sldId id="300" r:id="rId33"/>
+    <p:sldId id="301" r:id="rId34"/>
+    <p:sldId id="274" r:id="rId35"/>
+    <p:sldId id="299" r:id="rId36"/>
+    <p:sldId id="269" r:id="rId37"/>
+    <p:sldId id="286" r:id="rId38"/>
+    <p:sldId id="270" r:id="rId39"/>
     <p:sldId id="285" r:id="rId40"/>
     <p:sldId id="287" r:id="rId41"/>
   </p:sldIdLst>
@@ -182,10 +182,6 @@
 </p:presentation>
 </file>
 
-<file path=ppt/revisionInfo.xml><?xml version="1.0" encoding="utf-8"?>
-<p1510:revInfo xmlns:a="http://schemas.openxmlformats.org/drawingml/2006/main" xmlns:r="http://schemas.openxmlformats.org/officeDocument/2006/relationships" xmlns:p1510="http://schemas.microsoft.com/office/powerpoint/2015/10/main"/>
-</file>
-
 <file path=ppt/handoutMasters/handoutMaster1.xml><?xml version="1.0" encoding="utf-8"?>
 <p:handoutMaster xmlns:a="http://schemas.openxmlformats.org/drawingml/2006/main" xmlns:r="http://schemas.openxmlformats.org/officeDocument/2006/relationships" xmlns:p="http://schemas.openxmlformats.org/presentationml/2006/main">
   <p:cSld>
@@ -268,7 +264,7 @@
           <a:p>
             <a:fld id="{E7CA5475-1311-45DC-B51B-D3E435D31F4C}" type="datetimeFigureOut">
               <a:rPr lang="en-US" smtClean="0"/>
-              <a:t>7/3/2017</a:t>
+              <a:t>10/21/2018</a:t>
             </a:fld>
             <a:endParaRPr lang="en-US"/>
           </a:p>
@@ -433,7 +429,7 @@
           <a:p>
             <a:fld id="{06674F5A-56E8-40A4-BD50-7225B14DC1C7}" type="datetimeFigureOut">
               <a:rPr lang="en-US" smtClean="0"/>
-              <a:t>7/3/2017</a:t>
+              <a:t>10/21/2018</a:t>
             </a:fld>
             <a:endParaRPr lang="en-US"/>
           </a:p>
@@ -963,7 +959,7 @@
           <a:p>
             <a:fld id="{1AE20A72-B8E1-46A7-AC63-F989E9C837CC}" type="datetimeFigureOut">
               <a:rPr lang="en-US" smtClean="0"/>
-              <a:t>7/3/2017</a:t>
+              <a:t>10/21/2018</a:t>
             </a:fld>
             <a:endParaRPr lang="en-US"/>
           </a:p>
@@ -1131,7 +1127,7 @@
           <a:p>
             <a:fld id="{1AE20A72-B8E1-46A7-AC63-F989E9C837CC}" type="datetimeFigureOut">
               <a:rPr lang="en-US" smtClean="0"/>
-              <a:t>7/3/2017</a:t>
+              <a:t>10/21/2018</a:t>
             </a:fld>
             <a:endParaRPr lang="en-US"/>
           </a:p>
@@ -1309,7 +1305,7 @@
           <a:p>
             <a:fld id="{1AE20A72-B8E1-46A7-AC63-F989E9C837CC}" type="datetimeFigureOut">
               <a:rPr lang="en-US" smtClean="0"/>
-              <a:t>7/3/2017</a:t>
+              <a:t>10/21/2018</a:t>
             </a:fld>
             <a:endParaRPr lang="en-US"/>
           </a:p>
@@ -1490,7 +1486,7 @@
           <a:p>
             <a:fld id="{1AE20A72-B8E1-46A7-AC63-F989E9C837CC}" type="datetimeFigureOut">
               <a:rPr lang="en-US" smtClean="0"/>
-              <a:t>7/3/2017</a:t>
+              <a:t>10/21/2018</a:t>
             </a:fld>
             <a:endParaRPr lang="en-US"/>
           </a:p>
@@ -1511,7 +1507,7 @@
           <a:bodyPr/>
           <a:lstStyle/>
           <a:p>
-            <a:endParaRPr lang="en-US"/>
+            <a:endParaRPr lang="en-US" dirty="0"/>
           </a:p>
         </p:txBody>
       </p:sp>
@@ -1735,7 +1731,7 @@
           <a:p>
             <a:fld id="{1AE20A72-B8E1-46A7-AC63-F989E9C837CC}" type="datetimeFigureOut">
               <a:rPr lang="en-US" smtClean="0"/>
-              <a:t>7/3/2017</a:t>
+              <a:t>10/21/2018</a:t>
             </a:fld>
             <a:endParaRPr lang="en-US"/>
           </a:p>
@@ -2020,7 +2016,7 @@
           <a:p>
             <a:fld id="{1AE20A72-B8E1-46A7-AC63-F989E9C837CC}" type="datetimeFigureOut">
               <a:rPr lang="en-US" smtClean="0"/>
-              <a:t>7/3/2017</a:t>
+              <a:t>10/21/2018</a:t>
             </a:fld>
             <a:endParaRPr lang="en-US"/>
           </a:p>
@@ -2439,7 +2435,7 @@
           <a:p>
             <a:fld id="{1AE20A72-B8E1-46A7-AC63-F989E9C837CC}" type="datetimeFigureOut">
               <a:rPr lang="en-US" smtClean="0"/>
-              <a:t>7/3/2017</a:t>
+              <a:t>10/21/2018</a:t>
             </a:fld>
             <a:endParaRPr lang="en-US"/>
           </a:p>
@@ -2556,7 +2552,7 @@
           <a:p>
             <a:fld id="{1AE20A72-B8E1-46A7-AC63-F989E9C837CC}" type="datetimeFigureOut">
               <a:rPr lang="en-US" smtClean="0"/>
-              <a:t>7/3/2017</a:t>
+              <a:t>10/21/2018</a:t>
             </a:fld>
             <a:endParaRPr lang="en-US"/>
           </a:p>
@@ -2651,7 +2647,7 @@
           <a:p>
             <a:fld id="{1AE20A72-B8E1-46A7-AC63-F989E9C837CC}" type="datetimeFigureOut">
               <a:rPr lang="en-US" smtClean="0"/>
-              <a:t>7/3/2017</a:t>
+              <a:t>10/21/2018</a:t>
             </a:fld>
             <a:endParaRPr lang="en-US"/>
           </a:p>
@@ -2926,7 +2922,7 @@
           <a:p>
             <a:fld id="{1AE20A72-B8E1-46A7-AC63-F989E9C837CC}" type="datetimeFigureOut">
               <a:rPr lang="en-US" smtClean="0"/>
-              <a:t>7/3/2017</a:t>
+              <a:t>10/21/2018</a:t>
             </a:fld>
             <a:endParaRPr lang="en-US"/>
           </a:p>
@@ -3181,7 +3177,7 @@
           <a:p>
             <a:fld id="{1AE20A72-B8E1-46A7-AC63-F989E9C837CC}" type="datetimeFigureOut">
               <a:rPr lang="en-US" smtClean="0"/>
-              <a:t>7/3/2017</a:t>
+              <a:t>10/21/2018</a:t>
             </a:fld>
             <a:endParaRPr lang="en-US"/>
           </a:p>
@@ -3264,35 +3260,6 @@
           <a:chExt cx="0" cy="0"/>
         </a:xfrm>
       </p:grpSpPr>
-      <p:pic>
-        <p:nvPicPr>
-          <p:cNvPr id="7" name="Picture 6"/>
-          <p:cNvPicPr>
-            <a:picLocks noChangeAspect="1"/>
-          </p:cNvPicPr>
-          <p:nvPr userDrawn="1"/>
-        </p:nvPicPr>
-        <p:blipFill rotWithShape="1">
-          <a:blip r:embed="rId13" cstate="print">
-            <a:extLst>
-              <a:ext uri="{28A0092B-C50C-407E-A947-70E740481C1C}">
-                <a14:useLocalDpi xmlns:a14="http://schemas.microsoft.com/office/drawing/2010/main" val="0"/>
-              </a:ext>
-            </a:extLst>
-          </a:blip>
-          <a:srcRect t="29080" b="31797"/>
-          <a:stretch/>
-        </p:blipFill>
-        <p:spPr>
-          <a:xfrm>
-            <a:off x="3695530" y="6172200"/>
-            <a:ext cx="1752940" cy="685800"/>
-          </a:xfrm>
-          <a:prstGeom prst="rect">
-            <a:avLst/>
-          </a:prstGeom>
-        </p:spPr>
-      </p:pic>
       <p:sp>
         <p:nvSpPr>
           <p:cNvPr id="2" name="Title Placeholder 1"/>
@@ -3422,7 +3389,7 @@
           <a:p>
             <a:fld id="{1AE20A72-B8E1-46A7-AC63-F989E9C837CC}" type="datetimeFigureOut">
               <a:rPr lang="en-US" smtClean="0"/>
-              <a:t>7/3/2017</a:t>
+              <a:t>10/21/2018</a:t>
             </a:fld>
             <a:endParaRPr lang="en-US"/>
           </a:p>
@@ -3506,6 +3473,42 @@
           </a:p>
         </p:txBody>
       </p:sp>
+      <p:pic>
+        <p:nvPicPr>
+          <p:cNvPr id="11" name="Picture 10">
+            <a:extLst>
+              <a:ext uri="{FF2B5EF4-FFF2-40B4-BE49-F238E27FC236}">
+                <a16:creationId xmlns:a16="http://schemas.microsoft.com/office/drawing/2014/main" id="{47D76327-C7FA-4FA5-BEFD-197F387864C7}"/>
+              </a:ext>
+            </a:extLst>
+          </p:cNvPr>
+          <p:cNvPicPr>
+            <a:picLocks noChangeAspect="1"/>
+          </p:cNvPicPr>
+          <p:nvPr userDrawn="1"/>
+        </p:nvPicPr>
+        <p:blipFill>
+          <a:blip r:embed="rId13">
+            <a:extLst>
+              <a:ext uri="{28A0092B-C50C-407E-A947-70E740481C1C}">
+                <a14:useLocalDpi xmlns:a14="http://schemas.microsoft.com/office/drawing/2010/main" val="0"/>
+              </a:ext>
+            </a:extLst>
+          </a:blip>
+          <a:stretch>
+            <a:fillRect/>
+          </a:stretch>
+        </p:blipFill>
+        <p:spPr>
+          <a:xfrm>
+            <a:off x="3352952" y="6266531"/>
+            <a:ext cx="2438095" cy="466667"/>
+          </a:xfrm>
+          <a:prstGeom prst="rect">
+            <a:avLst/>
+          </a:prstGeom>
+        </p:spPr>
+      </p:pic>
     </p:spTree>
     <p:extLst>
       <p:ext uri="{BB962C8B-B14F-4D97-AF65-F5344CB8AC3E}">
@@ -4514,7 +4517,7 @@
         </p:spPr>
         <p:txBody>
           <a:bodyPr>
-            <a:normAutofit fontScale="70000" lnSpcReduction="20000"/>
+            <a:normAutofit fontScale="62500" lnSpcReduction="20000"/>
           </a:bodyPr>
           <a:lstStyle/>
           <a:p>
@@ -4560,6 +4563,23 @@
             <a:r>
               <a:rPr lang="en-US" dirty="0"/>
               <a:t>Click “Refresh” to view them</a:t>
+            </a:r>
+          </a:p>
+          <a:p>
+            <a:pPr lvl="1"/>
+            <a:r>
+              <a:rPr lang="en-US" dirty="0"/>
+              <a:t>Type ratings follow conventions at </a:t>
+            </a:r>
+            <a:r>
+              <a:rPr lang="en-US" dirty="0">
+                <a:hlinkClick r:id="rId2"/>
+              </a:rPr>
+              <a:t>http://registry.faa.gov/TypeRatings/</a:t>
+            </a:r>
+            <a:r>
+              <a:rPr lang="en-US" dirty="0"/>
+              <a:t> </a:t>
             </a:r>
           </a:p>
         </p:txBody>
@@ -4575,7 +4595,7 @@
           </p:nvPr>
         </p:nvPicPr>
         <p:blipFill>
-          <a:blip r:embed="rId2"/>
+          <a:blip r:embed="rId3"/>
           <a:stretch>
             <a:fillRect/>
           </a:stretch>
@@ -5165,92 +5185,109 @@
         </p:spPr>
         <p:txBody>
           <a:bodyPr>
-            <a:normAutofit/>
+            <a:normAutofit fontScale="92500" lnSpcReduction="10000"/>
           </a:bodyPr>
           <a:lstStyle/>
           <a:p>
             <a:r>
+              <a:rPr lang="en-US" sz="1400" b="1" dirty="0"/>
+              <a:t>Dupes</a:t>
+            </a:r>
+            <a:r>
               <a:rPr lang="en-US" sz="1400" dirty="0"/>
-              <a:t>Dupes: show aircraft that could be duplicates of each other </a:t>
+              <a:t>: show aircraft that could be duplicates of each other </a:t>
+            </a:r>
+          </a:p>
+          <a:p>
+            <a:pPr lvl="1"/>
+            <a:r>
+              <a:rPr lang="en-US" sz="1000" dirty="0"/>
+              <a:t>Doesn’t happen any more, AFAICT</a:t>
+            </a:r>
+          </a:p>
+          <a:p>
+            <a:r>
+              <a:rPr lang="en-US" sz="1400" b="1" dirty="0"/>
+              <a:t>Dupe Sims</a:t>
+            </a:r>
+            <a:r>
+              <a:rPr lang="en-US" sz="1400" dirty="0"/>
+              <a:t>: when models are merged, there could be dupes.</a:t>
+            </a:r>
+          </a:p>
+          <a:p>
+            <a:pPr lvl="1"/>
+            <a:r>
+              <a:rPr lang="en-US" sz="1000" dirty="0"/>
+              <a:t>In a set of duplicates, can click “Keep this” to resolve the duplicate for the </a:t>
+            </a:r>
+            <a:br>
+              <a:rPr lang="en-US" sz="1000" dirty="0"/>
+            </a:br>
+            <a:r>
+              <a:rPr lang="en-US" sz="1000" dirty="0"/>
+              <a:t>same model/sim level</a:t>
+            </a:r>
+          </a:p>
+          <a:p>
+            <a:r>
+              <a:rPr lang="en-US" sz="1400" b="1" dirty="0"/>
+              <a:t>Invalid Aircraft</a:t>
+            </a:r>
+            <a:r>
+              <a:rPr lang="en-US" sz="1400" dirty="0"/>
+              <a:t>: does an integrity check on all aircraft </a:t>
+            </a:r>
+          </a:p>
+          <a:p>
+            <a:r>
+              <a:rPr lang="en-US" sz="1400" b="1" dirty="0"/>
+              <a:t>All Sims</a:t>
+            </a:r>
+            <a:r>
+              <a:rPr lang="en-US" sz="1400" dirty="0"/>
+              <a:t>: displays all sims in the system, allows for </a:t>
             </a:r>
             <a:br>
               <a:rPr lang="en-US" sz="1400" dirty="0"/>
             </a:br>
             <a:r>
               <a:rPr lang="en-US" sz="1400" dirty="0"/>
-              <a:t>(doesn’t happen any more, AFAICT)</a:t>
-            </a:r>
-          </a:p>
-          <a:p>
+              <a:t>renaming.  Just informational, really.</a:t>
+            </a:r>
+          </a:p>
+          <a:p>
+            <a:r>
+              <a:rPr lang="en-US" sz="1400" b="1" dirty="0"/>
+              <a:t>Orphaned Aircraft</a:t>
+            </a:r>
             <a:r>
               <a:rPr lang="en-US" sz="1400" dirty="0"/>
-              <a:t>Dupe Sims: when models are merged, there could be dupes.</a:t>
+              <a:t>: displays all aircraft that have no owners</a:t>
             </a:r>
           </a:p>
           <a:p>
             <a:pPr lvl="1"/>
             <a:r>
               <a:rPr lang="en-US" sz="1000" dirty="0"/>
-              <a:t>In a set of duplicates, can click “Keep this” to resolve the duplicate for the </a:t>
-            </a:r>
-            <a:br>
+              <a:t>E.g., pilot created it, then removed it from their profile.</a:t>
+            </a:r>
+          </a:p>
+          <a:p>
+            <a:pPr lvl="1"/>
+            <a:r>
               <a:rPr lang="en-US" sz="1000" dirty="0"/>
-            </a:br>
-            <a:r>
-              <a:rPr lang="en-US" sz="1000" dirty="0"/>
-              <a:t>same model/sim level</a:t>
-            </a:r>
-          </a:p>
-          <a:p>
+              <a:t>Good to clean these up periodically; doing so can reveal models that are also orphaned, and possibly cleaning that up would reveal an orphaned manufacturer.</a:t>
+            </a:r>
+          </a:p>
+          <a:p>
+            <a:r>
+              <a:rPr lang="en-US" sz="1400" b="1" dirty="0"/>
+              <a:t>Pseudo-generic aircraft</a:t>
+            </a:r>
             <a:r>
               <a:rPr lang="en-US" sz="1400" dirty="0"/>
-              <a:t>Invalid Aircraft: does an integrity check on all aircraft </a:t>
-            </a:r>
-            <a:br>
-              <a:rPr lang="en-US" sz="1400" dirty="0"/>
-            </a:br>
-            <a:r>
-              <a:rPr lang="en-US" sz="1400" dirty="0"/>
-              <a:t>(VERY SLOW) </a:t>
-            </a:r>
-          </a:p>
-          <a:p>
-            <a:pPr lvl="1"/>
-            <a:r>
-              <a:rPr lang="en-US" sz="1200" dirty="0"/>
-              <a:t>Generally also arises because of change after the aircraft is </a:t>
-            </a:r>
-            <a:br>
-              <a:rPr lang="en-US" sz="1200" dirty="0"/>
-            </a:br>
-            <a:r>
-              <a:rPr lang="en-US" sz="1200" dirty="0"/>
-              <a:t>created</a:t>
-            </a:r>
-          </a:p>
-          <a:p>
-            <a:r>
-              <a:rPr lang="en-US" sz="1400" dirty="0"/>
-              <a:t>All Sims: displays all sims in the system, allows for </a:t>
-            </a:r>
-            <a:br>
-              <a:rPr lang="en-US" sz="1400" dirty="0"/>
-            </a:br>
-            <a:r>
-              <a:rPr lang="en-US" sz="1400" dirty="0"/>
-              <a:t>renaming.  Just informational, really.</a:t>
-            </a:r>
-          </a:p>
-          <a:p>
-            <a:r>
-              <a:rPr lang="en-US" sz="1400" dirty="0"/>
-              <a:t>Orphaned Aircraft: displays all aircraft that have no owners (pilot created it, then removed it from their profile).  Good to clean these up periodically; doing so can reveal models that are also orphaned, and possibly cleaning that up would reveal an orphaned manufacturer.</a:t>
-            </a:r>
-          </a:p>
-          <a:p>
-            <a:r>
-              <a:rPr lang="en-US" sz="1400" dirty="0"/>
-              <a:t>Pseudo-generic aircraft: shows aircraft that look like proxies for generic aircraft.  E.g., creating a C-172 with the </a:t>
+              <a:t>: shows aircraft that look like proxies for generic aircraft.  E.g., creating a C-172 with the </a:t>
             </a:r>
             <a:r>
               <a:rPr lang="en-US" sz="1400" dirty="0" err="1"/>
@@ -5270,24 +5307,91 @@
           </a:p>
           <a:p>
             <a:r>
+              <a:rPr lang="en-US" sz="1400" b="1" dirty="0"/>
+              <a:t>Delete Dupe User Aircraft</a:t>
+            </a:r>
+            <a:r>
               <a:rPr lang="en-US" sz="1400" dirty="0"/>
-              <a:t>Delete Dupe User Aircraft: looks for users with multiple copies of the same aircraft in their profile and resolves the dupes</a:t>
-            </a:r>
-          </a:p>
-          <a:p>
+              <a:t>: looks for users with multiple copies of the same aircraft in their profile and resolves the dupes</a:t>
+            </a:r>
+          </a:p>
+          <a:p>
+            <a:r>
+              <a:rPr lang="en-US" sz="1400" b="1" dirty="0"/>
+              <a:t>Country Codes</a:t>
+            </a:r>
             <a:r>
               <a:rPr lang="en-US" sz="1400" dirty="0"/>
-              <a:t>Find Aircraft by Tail: allows lookup of aircraft by FULL registration (no partial search)</a:t>
+              <a:t>: Allows for management of aircraft prefixes</a:t>
+            </a:r>
+          </a:p>
+          <a:p>
+            <a:pPr lvl="1"/>
+            <a:r>
+              <a:rPr lang="en-US" sz="1000" dirty="0"/>
+              <a:t>Whether or not a hyphen should be used by default</a:t>
+            </a:r>
+          </a:p>
+          <a:p>
+            <a:pPr lvl="1"/>
+            <a:r>
+              <a:rPr lang="en-US" sz="1000" dirty="0"/>
+              <a:t>Template for looking up of aircraft registrations</a:t>
+            </a:r>
+          </a:p>
+          <a:p>
+            <a:r>
+              <a:rPr lang="en-US" sz="1400" b="1" dirty="0"/>
+              <a:t>Clean Up Maintenance</a:t>
+            </a:r>
+            <a:r>
+              <a:rPr lang="en-US" sz="1400" dirty="0"/>
+              <a:t>: you can’t maintain a sim or generic, so this removes any such records </a:t>
+            </a:r>
+          </a:p>
+          <a:p>
+            <a:pPr lvl="1"/>
+            <a:r>
+              <a:rPr lang="en-US" sz="1000" dirty="0"/>
+              <a:t>Shouldn’t happen</a:t>
+            </a:r>
+          </a:p>
+          <a:p>
+            <a:r>
+              <a:rPr lang="en-US" sz="1400" b="1" dirty="0"/>
+              <a:t>Bulk Map Models</a:t>
+            </a:r>
+            <a:r>
+              <a:rPr lang="en-US" sz="1400" dirty="0"/>
+              <a:t>:</a:t>
+            </a:r>
+            <a:r>
+              <a:rPr lang="en-US" sz="1400" b="1" dirty="0"/>
+              <a:t> </a:t>
+            </a:r>
+            <a:r>
+              <a:rPr lang="en-US" sz="1400" dirty="0"/>
+              <a:t>allows bulk mapping of aircraft from one model to another.</a:t>
+            </a:r>
+          </a:p>
+          <a:p>
+            <a:r>
+              <a:rPr lang="en-US" sz="1400" b="1" dirty="0"/>
+              <a:t>Find Aircraft by Tail</a:t>
+            </a:r>
+            <a:r>
+              <a:rPr lang="en-US" sz="1400" dirty="0"/>
+              <a:t>: allows lookup of aircraft by FULL registration (no partial search)</a:t>
             </a:r>
           </a:p>
         </p:txBody>
       </p:sp>
       <p:pic>
         <p:nvPicPr>
-          <p:cNvPr id="5" name="Picture 4">
+          <p:cNvPr id="4" name="Picture 3">
             <a:extLst>
               <a:ext uri="{FF2B5EF4-FFF2-40B4-BE49-F238E27FC236}">
-                <a16:creationId xmlns:a16="http://schemas.microsoft.com/office/drawing/2014/main" id="{0E9E40D6-C9EE-4C64-8A3F-1B953C0D4161}"/>
+                <a16:creationId xmlns:a16="http://schemas.microsoft.com/office/drawing/2014/main" id="{E93424D2-DF2E-4AED-A4FE-5EA791C9F8C4}"/>
               </a:ext>
             </a:extLst>
           </p:cNvPr>
@@ -5297,14 +5401,20 @@
           <p:nvPr/>
         </p:nvPicPr>
         <p:blipFill rotWithShape="1">
-          <a:blip r:embed="rId3"/>
-          <a:srcRect l="8334" t="17306" r="62500" b="61274"/>
+          <a:blip r:embed="rId3" cstate="print">
+            <a:extLst>
+              <a:ext uri="{28A0092B-C50C-407E-A947-70E740481C1C}">
+                <a14:useLocalDpi xmlns:a14="http://schemas.microsoft.com/office/drawing/2010/main"/>
+              </a:ext>
+            </a:extLst>
+          </a:blip>
+          <a:srcRect/>
           <a:stretch/>
         </p:blipFill>
         <p:spPr>
           <a:xfrm>
-            <a:off x="5334000" y="1295400"/>
-            <a:ext cx="3655232" cy="1984269"/>
+            <a:off x="5333999" y="1294878"/>
+            <a:ext cx="3686211" cy="2134122"/>
           </a:xfrm>
           <a:prstGeom prst="rect">
             <a:avLst/>
@@ -5998,6 +6108,133 @@
 </file>
 
 <file path=ppt/slides/slide21.xml><?xml version="1.0" encoding="utf-8"?>
+<p:sld xmlns:a="http://schemas.openxmlformats.org/drawingml/2006/main" xmlns:r="http://schemas.openxmlformats.org/officeDocument/2006/relationships" xmlns:p="http://schemas.openxmlformats.org/presentationml/2006/main">
+  <p:cSld>
+    <p:spTree>
+      <p:nvGrpSpPr>
+        <p:cNvPr id="1" name=""/>
+        <p:cNvGrpSpPr/>
+        <p:nvPr/>
+      </p:nvGrpSpPr>
+      <p:grpSpPr>
+        <a:xfrm>
+          <a:off x="0" y="0"/>
+          <a:ext cx="0" cy="0"/>
+          <a:chOff x="0" y="0"/>
+          <a:chExt cx="0" cy="0"/>
+        </a:xfrm>
+      </p:grpSpPr>
+      <p:sp>
+        <p:nvSpPr>
+          <p:cNvPr id="2" name="Title 1">
+            <a:extLst>
+              <a:ext uri="{FF2B5EF4-FFF2-40B4-BE49-F238E27FC236}">
+                <a16:creationId xmlns:a16="http://schemas.microsoft.com/office/drawing/2014/main" id="{88A7F986-A282-4E24-B7E0-7AFF669ED41E}"/>
+              </a:ext>
+            </a:extLst>
+          </p:cNvPr>
+          <p:cNvSpPr>
+            <a:spLocks noGrp="1"/>
+          </p:cNvSpPr>
+          <p:nvPr>
+            <p:ph type="title"/>
+          </p:nvPr>
+        </p:nvSpPr>
+        <p:spPr/>
+        <p:txBody>
+          <a:bodyPr/>
+          <a:lstStyle/>
+          <a:p>
+            <a:r>
+              <a:rPr lang="en-US" dirty="0"/>
+              <a:t>Rules about editing aircraft</a:t>
+            </a:r>
+          </a:p>
+        </p:txBody>
+      </p:sp>
+      <p:sp>
+        <p:nvSpPr>
+          <p:cNvPr id="3" name="Content Placeholder 2">
+            <a:extLst>
+              <a:ext uri="{FF2B5EF4-FFF2-40B4-BE49-F238E27FC236}">
+                <a16:creationId xmlns:a16="http://schemas.microsoft.com/office/drawing/2014/main" id="{1A08B9CE-B737-4945-BC4A-94FD5B57CA53}"/>
+              </a:ext>
+            </a:extLst>
+          </p:cNvPr>
+          <p:cNvSpPr>
+            <a:spLocks noGrp="1"/>
+          </p:cNvSpPr>
+          <p:nvPr>
+            <p:ph idx="1"/>
+          </p:nvPr>
+        </p:nvSpPr>
+        <p:spPr/>
+        <p:txBody>
+          <a:bodyPr>
+            <a:normAutofit fontScale="70000" lnSpcReduction="20000"/>
+          </a:bodyPr>
+          <a:lstStyle/>
+          <a:p>
+            <a:r>
+              <a:rPr lang="en-US" dirty="0"/>
+              <a:t>Users can’t edit an aircraft that is a sim, generic, or locked</a:t>
+            </a:r>
+          </a:p>
+          <a:p>
+            <a:r>
+              <a:rPr lang="en-US" dirty="0"/>
+              <a:t>If a user edits it and the ICAO code changes, this is considered a “major” change and the aircraft is cloned with the user in the new model</a:t>
+            </a:r>
+          </a:p>
+          <a:p>
+            <a:pPr lvl="1"/>
+            <a:r>
+              <a:rPr lang="en-US" dirty="0"/>
+              <a:t>E.g., editing N12345 from being a B-737 to a C-172</a:t>
+            </a:r>
+          </a:p>
+          <a:p>
+            <a:r>
+              <a:rPr lang="en-US" dirty="0"/>
+              <a:t>If a user edits it and the ICAO code does not change, it is a “minor change” and the underlying aircraft is modified.</a:t>
+            </a:r>
+          </a:p>
+          <a:p>
+            <a:pPr lvl="1"/>
+            <a:r>
+              <a:rPr lang="en-US" dirty="0"/>
+              <a:t>E.g., editing N12345 from being a C-172N to a C-172S.</a:t>
+            </a:r>
+          </a:p>
+          <a:p>
+            <a:r>
+              <a:rPr lang="en-US" dirty="0"/>
+              <a:t>Either edit above sends a notification email</a:t>
+            </a:r>
+          </a:p>
+          <a:p>
+            <a:pPr lvl="1"/>
+            <a:r>
+              <a:rPr lang="en-US" dirty="0"/>
+              <a:t>If the aircraft is cloned and the new version is the current assignment, then a “Make Default” button will appear (in admin mode) next to the non-default version</a:t>
+            </a:r>
+          </a:p>
+        </p:txBody>
+      </p:sp>
+    </p:spTree>
+    <p:extLst>
+      <p:ext uri="{BB962C8B-B14F-4D97-AF65-F5344CB8AC3E}">
+        <p14:creationId xmlns:p14="http://schemas.microsoft.com/office/powerpoint/2010/main" val="1759932693"/>
+      </p:ext>
+    </p:extLst>
+  </p:cSld>
+  <p:clrMapOvr>
+    <a:masterClrMapping/>
+  </p:clrMapOvr>
+</p:sld>
+</file>
+
+<file path=ppt/slides/slide22.xml><?xml version="1.0" encoding="utf-8"?>
 <p:sld xmlns:a="http://schemas.openxmlformats.org/drawingml/2006/main" xmlns:r="http://schemas.openxmlformats.org/officeDocument/2006/relationships" xmlns:p="http://schemas.openxmlformats.org/presentationml/2006/main">
   <p:cSld>
     <p:spTree>
@@ -6155,7 +6392,7 @@
 </p:sld>
 </file>
 
-<file path=ppt/slides/slide22.xml><?xml version="1.0" encoding="utf-8"?>
+<file path=ppt/slides/slide23.xml><?xml version="1.0" encoding="utf-8"?>
 <p:sld xmlns:a="http://schemas.openxmlformats.org/drawingml/2006/main" xmlns:r="http://schemas.openxmlformats.org/officeDocument/2006/relationships" xmlns:p="http://schemas.openxmlformats.org/presentationml/2006/main">
   <p:cSld>
     <p:spTree>
@@ -6263,7 +6500,7 @@
 </p:sld>
 </file>
 
-<file path=ppt/slides/slide23.xml><?xml version="1.0" encoding="utf-8"?>
+<file path=ppt/slides/slide24.xml><?xml version="1.0" encoding="utf-8"?>
 <p:sld xmlns:a="http://schemas.openxmlformats.org/drawingml/2006/main" xmlns:r="http://schemas.openxmlformats.org/officeDocument/2006/relationships" xmlns:p="http://schemas.openxmlformats.org/presentationml/2006/main">
   <p:cSld>
     <p:spTree>
@@ -6819,7 +7056,7 @@
 </p:sld>
 </file>
 
-<file path=ppt/slides/slide24.xml><?xml version="1.0" encoding="utf-8"?>
+<file path=ppt/slides/slide25.xml><?xml version="1.0" encoding="utf-8"?>
 <p:sld xmlns:a="http://schemas.openxmlformats.org/drawingml/2006/main" xmlns:r="http://schemas.openxmlformats.org/officeDocument/2006/relationships" xmlns:p="http://schemas.openxmlformats.org/presentationml/2006/main">
   <p:cSld>
     <p:spTree>
@@ -6997,7 +7234,7 @@
 </p:sld>
 </file>
 
-<file path=ppt/slides/slide25.xml><?xml version="1.0" encoding="utf-8"?>
+<file path=ppt/slides/slide26.xml><?xml version="1.0" encoding="utf-8"?>
 <p:sld xmlns:a="http://schemas.openxmlformats.org/drawingml/2006/main" xmlns:r="http://schemas.openxmlformats.org/officeDocument/2006/relationships" xmlns:p="http://schemas.openxmlformats.org/presentationml/2006/main">
   <p:cSld>
     <p:spTree>
@@ -8347,7 +8584,7 @@
 </p:sld>
 </file>
 
-<file path=ppt/slides/slide26.xml><?xml version="1.0" encoding="utf-8"?>
+<file path=ppt/slides/slide27.xml><?xml version="1.0" encoding="utf-8"?>
 <p:sld xmlns:a="http://schemas.openxmlformats.org/drawingml/2006/main" xmlns:r="http://schemas.openxmlformats.org/officeDocument/2006/relationships" xmlns:p="http://schemas.openxmlformats.org/presentationml/2006/main">
   <p:cSld>
     <p:spTree>
@@ -8462,15 +8699,7 @@
           <a:p>
             <a:r>
               <a:rPr lang="en-US" dirty="0"/>
-              <a:t>Flags: indicate special semantics of the property (mostly for use in things like currency computations).  Set flags using </a:t>
-            </a:r>
-            <a:r>
-              <a:rPr lang="en-US" dirty="0" err="1"/>
-              <a:t>checboxes</a:t>
-            </a:r>
-            <a:r>
-              <a:rPr lang="en-US" dirty="0"/>
-              <a:t>.</a:t>
+              <a:t>Flags: indicate special semantics of the property (mostly for use in things like currency computations).  Set flags using checkboxes.</a:t>
             </a:r>
           </a:p>
         </p:txBody>
@@ -8479,115 +8708,6 @@
     <p:extLst>
       <p:ext uri="{BB962C8B-B14F-4D97-AF65-F5344CB8AC3E}">
         <p14:creationId xmlns:p14="http://schemas.microsoft.com/office/powerpoint/2010/main" val="166056237"/>
-      </p:ext>
-    </p:extLst>
-  </p:cSld>
-  <p:clrMapOvr>
-    <a:masterClrMapping/>
-  </p:clrMapOvr>
-</p:sld>
-</file>
-
-<file path=ppt/slides/slide27.xml><?xml version="1.0" encoding="utf-8"?>
-<p:sld xmlns:a="http://schemas.openxmlformats.org/drawingml/2006/main" xmlns:r="http://schemas.openxmlformats.org/officeDocument/2006/relationships" xmlns:p="http://schemas.openxmlformats.org/presentationml/2006/main">
-  <p:cSld>
-    <p:spTree>
-      <p:nvGrpSpPr>
-        <p:cNvPr id="1" name=""/>
-        <p:cNvGrpSpPr/>
-        <p:nvPr/>
-      </p:nvGrpSpPr>
-      <p:grpSpPr>
-        <a:xfrm>
-          <a:off x="0" y="0"/>
-          <a:ext cx="0" cy="0"/>
-          <a:chOff x="0" y="0"/>
-          <a:chExt cx="0" cy="0"/>
-        </a:xfrm>
-      </p:grpSpPr>
-      <p:sp>
-        <p:nvSpPr>
-          <p:cNvPr id="2" name="Title 1"/>
-          <p:cNvSpPr>
-            <a:spLocks noGrp="1"/>
-          </p:cNvSpPr>
-          <p:nvPr>
-            <p:ph type="title"/>
-          </p:nvPr>
-        </p:nvSpPr>
-        <p:spPr/>
-        <p:txBody>
-          <a:bodyPr/>
-          <a:lstStyle/>
-          <a:p>
-            <a:r>
-              <a:rPr lang="en-US" dirty="0"/>
-              <a:t>Property Guidelines</a:t>
-            </a:r>
-          </a:p>
-        </p:txBody>
-      </p:sp>
-      <p:sp>
-        <p:nvSpPr>
-          <p:cNvPr id="3" name="Content Placeholder 2"/>
-          <p:cNvSpPr>
-            <a:spLocks noGrp="1"/>
-          </p:cNvSpPr>
-          <p:nvPr>
-            <p:ph idx="1"/>
-          </p:nvPr>
-        </p:nvSpPr>
-        <p:spPr/>
-        <p:txBody>
-          <a:bodyPr>
-            <a:normAutofit fontScale="85000" lnSpcReduction="10000"/>
-          </a:bodyPr>
-          <a:lstStyle/>
-          <a:p>
-            <a:r>
-              <a:rPr lang="en-US" dirty="0"/>
-              <a:t>Keep properties as general purpose as possible.  </a:t>
-            </a:r>
-          </a:p>
-          <a:p>
-            <a:pPr lvl="1"/>
-            <a:r>
-              <a:rPr lang="en-US" dirty="0"/>
-              <a:t>E.g., “Charity Flight” rather than “Angel Flight”</a:t>
-            </a:r>
-          </a:p>
-          <a:p>
-            <a:r>
-              <a:rPr lang="en-US" dirty="0"/>
-              <a:t>Add properties only for things that really don’t belong in comments – i.e., for which a pilot might wat to do a structured search or a pivot table in Excel</a:t>
-            </a:r>
-          </a:p>
-          <a:p>
-            <a:r>
-              <a:rPr lang="en-US" dirty="0"/>
-              <a:t>Avoid properties that combine independent things</a:t>
-            </a:r>
-          </a:p>
-          <a:p>
-            <a:pPr lvl="1"/>
-            <a:r>
-              <a:rPr lang="en-US" dirty="0"/>
-              <a:t>E.g., stay away from “Night Cross-country” or “Solo Night Cross Country.”.  </a:t>
-            </a:r>
-          </a:p>
-          <a:p>
-            <a:pPr lvl="1"/>
-            <a:r>
-              <a:rPr lang="en-US" dirty="0"/>
-              <a:t>This is an invitation to ambiguity or errors in the data, don’t do it.</a:t>
-            </a:r>
-          </a:p>
-        </p:txBody>
-      </p:sp>
-    </p:spTree>
-    <p:extLst>
-      <p:ext uri="{BB962C8B-B14F-4D97-AF65-F5344CB8AC3E}">
-        <p14:creationId xmlns:p14="http://schemas.microsoft.com/office/powerpoint/2010/main" val="1893513869"/>
       </p:ext>
     </p:extLst>
   </p:cSld>
@@ -8626,48 +8746,69 @@
         </p:nvSpPr>
         <p:spPr/>
         <p:txBody>
+          <a:bodyPr/>
+          <a:lstStyle/>
+          <a:p>
+            <a:r>
+              <a:rPr lang="en-US" dirty="0"/>
+              <a:t>Property Guidelines</a:t>
+            </a:r>
+          </a:p>
+        </p:txBody>
+      </p:sp>
+      <p:sp>
+        <p:nvSpPr>
+          <p:cNvPr id="3" name="Content Placeholder 2"/>
+          <p:cNvSpPr>
+            <a:spLocks noGrp="1"/>
+          </p:cNvSpPr>
+          <p:nvPr>
+            <p:ph idx="1"/>
+          </p:nvPr>
+        </p:nvSpPr>
+        <p:spPr/>
+        <p:txBody>
           <a:bodyPr>
-            <a:normAutofit fontScale="90000"/>
+            <a:normAutofit fontScale="85000" lnSpcReduction="10000"/>
           </a:bodyPr>
           <a:lstStyle/>
           <a:p>
             <a:r>
               <a:rPr lang="en-US" dirty="0"/>
-              <a:t>Admin Tools: Endorsement Templates</a:t>
-            </a:r>
-          </a:p>
-        </p:txBody>
-      </p:sp>
-      <p:sp>
-        <p:nvSpPr>
-          <p:cNvPr id="3" name="Content Placeholder 2"/>
-          <p:cNvSpPr>
-            <a:spLocks noGrp="1"/>
-          </p:cNvSpPr>
-          <p:nvPr>
-            <p:ph idx="1"/>
-          </p:nvPr>
-        </p:nvSpPr>
-        <p:spPr/>
-        <p:txBody>
-          <a:bodyPr/>
-          <a:lstStyle/>
-          <a:p>
-            <a:r>
-              <a:rPr lang="en-US" dirty="0"/>
-              <a:t>This is where templates can be created/edited for endorsements that a flight instructor can give to a student</a:t>
-            </a:r>
-          </a:p>
-          <a:p>
-            <a:r>
-              <a:rPr lang="en-US" dirty="0"/>
-              <a:t>Uses a pseudo-markup language to specify placeholders for student name, date, etc.</a:t>
-            </a:r>
-          </a:p>
-          <a:p>
-            <a:r>
-              <a:rPr lang="en-US" dirty="0"/>
-              <a:t>Shouldn’t need to use much.</a:t>
+              <a:t>Keep properties as general purpose as possible.  </a:t>
+            </a:r>
+          </a:p>
+          <a:p>
+            <a:pPr lvl="1"/>
+            <a:r>
+              <a:rPr lang="en-US" dirty="0"/>
+              <a:t>E.g., “Charity Flight” rather than “Angel Flight”</a:t>
+            </a:r>
+          </a:p>
+          <a:p>
+            <a:r>
+              <a:rPr lang="en-US" dirty="0"/>
+              <a:t>Add properties only for things that really don’t belong in comments – i.e., for which a pilot might wat to do a structured search or a pivot table in Excel</a:t>
+            </a:r>
+          </a:p>
+          <a:p>
+            <a:r>
+              <a:rPr lang="en-US" dirty="0"/>
+              <a:t>Avoid properties that combine independent things</a:t>
+            </a:r>
+          </a:p>
+          <a:p>
+            <a:pPr lvl="1"/>
+            <a:r>
+              <a:rPr lang="en-US" dirty="0"/>
+              <a:t>E.g., stay away from “Night Cross-country” or “Solo Night Cross Country.”.  </a:t>
+            </a:r>
+          </a:p>
+          <a:p>
+            <a:pPr lvl="1"/>
+            <a:r>
+              <a:rPr lang="en-US" dirty="0"/>
+              <a:t>This is an invitation to ambiguity or errors in the data, don’t do it.</a:t>
             </a:r>
           </a:p>
         </p:txBody>
@@ -8675,7 +8816,7 @@
     </p:spTree>
     <p:extLst>
       <p:ext uri="{BB962C8B-B14F-4D97-AF65-F5344CB8AC3E}">
-        <p14:creationId xmlns:p14="http://schemas.microsoft.com/office/powerpoint/2010/main" val="1248576311"/>
+        <p14:creationId xmlns:p14="http://schemas.microsoft.com/office/powerpoint/2010/main" val="1893513869"/>
       </p:ext>
     </p:extLst>
   </p:cSld>
@@ -8714,12 +8855,14 @@
         </p:nvSpPr>
         <p:spPr/>
         <p:txBody>
-          <a:bodyPr/>
-          <a:lstStyle/>
-          <a:p>
-            <a:r>
-              <a:rPr lang="en-US" dirty="0"/>
-              <a:t>Admin Tool: Edit FAQ</a:t>
+          <a:bodyPr>
+            <a:normAutofit fontScale="90000"/>
+          </a:bodyPr>
+          <a:lstStyle/>
+          <a:p>
+            <a:r>
+              <a:rPr lang="en-US" dirty="0"/>
+              <a:t>Admin Tools: Endorsement Templates</a:t>
             </a:r>
           </a:p>
         </p:txBody>
@@ -8737,52 +8880,54 @@
         <p:spPr/>
         <p:txBody>
           <a:bodyPr>
-            <a:normAutofit fontScale="85000" lnSpcReduction="20000"/>
+            <a:normAutofit fontScale="92500" lnSpcReduction="20000"/>
           </a:bodyPr>
           <a:lstStyle/>
           <a:p>
             <a:r>
               <a:rPr lang="en-US" dirty="0"/>
-              <a:t>Link to FAQ is on bottom of every page.</a:t>
-            </a:r>
-          </a:p>
-          <a:p>
-            <a:r>
-              <a:rPr lang="en-US" dirty="0"/>
-              <a:t>FAQ items consist of a category, a question, and an answer.  They are grouped by category at display time.</a:t>
-            </a:r>
-          </a:p>
-          <a:p>
-            <a:r>
-              <a:rPr lang="en-US" dirty="0"/>
-              <a:t>FAQ answer can contain HTML markup</a:t>
-            </a:r>
-          </a:p>
-          <a:p>
-            <a:r>
-              <a:rPr lang="en-US" dirty="0"/>
-              <a:t>FAQ is branding-aware (will use correct brand based on environment)</a:t>
+              <a:t>This is where templates can be created/edited for endorsements that a flight instructor can give to a student</a:t>
+            </a:r>
+          </a:p>
+          <a:p>
+            <a:r>
+              <a:rPr lang="en-US" dirty="0"/>
+              <a:t>Uses a pseudo-markup language to specify placeholders for student name, date, etc.</a:t>
             </a:r>
           </a:p>
           <a:p>
             <a:pPr lvl="1"/>
             <a:r>
               <a:rPr lang="en-US" dirty="0"/>
-              <a:t>All links should use relative paths (i.e., not include the domain name) to work with multiple brands</a:t>
+              <a:t>{x} for a single-line entry with watermark "x"</a:t>
             </a:r>
           </a:p>
           <a:p>
             <a:pPr lvl="1"/>
             <a:r>
               <a:rPr lang="en-US" dirty="0"/>
-              <a:t>Use “%APP_NAME%” for the application name</a:t>
+              <a:t>{Freeform} for freeform multi-line text (no watermark prompt)</a:t>
             </a:r>
           </a:p>
           <a:p>
             <a:pPr lvl="1"/>
             <a:r>
               <a:rPr lang="en-US" dirty="0"/>
-              <a:t>Use “%APP_URL%” for the application host name (e.g., “Myflightbook.com)</a:t>
+              <a:t>{Date} for the date (prefilled)</a:t>
+            </a:r>
+          </a:p>
+          <a:p>
+            <a:pPr lvl="1"/>
+            <a:r>
+              <a:rPr lang="en-US" dirty="0"/>
+              <a:t>{Student} for the Student's name (pre-filled)</a:t>
+            </a:r>
+          </a:p>
+          <a:p>
+            <a:pPr lvl="1"/>
+            <a:r>
+              <a:rPr lang="en-US" dirty="0"/>
+              <a:t>{x/y/z} for a drop-down of choices x, y, and z</a:t>
             </a:r>
           </a:p>
         </p:txBody>
@@ -8790,7 +8935,7 @@
     </p:spTree>
     <p:extLst>
       <p:ext uri="{BB962C8B-B14F-4D97-AF65-F5344CB8AC3E}">
-        <p14:creationId xmlns:p14="http://schemas.microsoft.com/office/powerpoint/2010/main" val="680066526"/>
+        <p14:creationId xmlns:p14="http://schemas.microsoft.com/office/powerpoint/2010/main" val="1248576311"/>
       </p:ext>
     </p:extLst>
   </p:cSld>
@@ -8893,6 +9038,156 @@
 </file>
 
 <file path=ppt/slides/slide30.xml><?xml version="1.0" encoding="utf-8"?>
+<p:sld xmlns:a="http://schemas.openxmlformats.org/drawingml/2006/main" xmlns:r="http://schemas.openxmlformats.org/officeDocument/2006/relationships" xmlns:p="http://schemas.openxmlformats.org/presentationml/2006/main">
+  <p:cSld>
+    <p:spTree>
+      <p:nvGrpSpPr>
+        <p:cNvPr id="1" name=""/>
+        <p:cNvGrpSpPr/>
+        <p:nvPr/>
+      </p:nvGrpSpPr>
+      <p:grpSpPr>
+        <a:xfrm>
+          <a:off x="0" y="0"/>
+          <a:ext cx="0" cy="0"/>
+          <a:chOff x="0" y="0"/>
+          <a:chExt cx="0" cy="0"/>
+        </a:xfrm>
+      </p:grpSpPr>
+      <p:sp>
+        <p:nvSpPr>
+          <p:cNvPr id="2" name="Title 1"/>
+          <p:cNvSpPr>
+            <a:spLocks noGrp="1"/>
+          </p:cNvSpPr>
+          <p:nvPr>
+            <p:ph type="title"/>
+          </p:nvPr>
+        </p:nvSpPr>
+        <p:spPr/>
+        <p:txBody>
+          <a:bodyPr/>
+          <a:lstStyle/>
+          <a:p>
+            <a:r>
+              <a:rPr lang="en-US" dirty="0"/>
+              <a:t>Admin Tool: Edit FAQ</a:t>
+            </a:r>
+          </a:p>
+        </p:txBody>
+      </p:sp>
+      <p:sp>
+        <p:nvSpPr>
+          <p:cNvPr id="3" name="Content Placeholder 2"/>
+          <p:cNvSpPr>
+            <a:spLocks noGrp="1"/>
+          </p:cNvSpPr>
+          <p:nvPr>
+            <p:ph idx="1"/>
+          </p:nvPr>
+        </p:nvSpPr>
+        <p:spPr/>
+        <p:txBody>
+          <a:bodyPr>
+            <a:normAutofit fontScale="55000" lnSpcReduction="20000"/>
+          </a:bodyPr>
+          <a:lstStyle/>
+          <a:p>
+            <a:r>
+              <a:rPr lang="en-US" dirty="0"/>
+              <a:t>Link to FAQ is on bottom of every page.</a:t>
+            </a:r>
+          </a:p>
+          <a:p>
+            <a:r>
+              <a:rPr lang="en-US" dirty="0"/>
+              <a:t>FAQ items consist of a category, a question, and an answer.  They are grouped by category at display time.</a:t>
+            </a:r>
+          </a:p>
+          <a:p>
+            <a:r>
+              <a:rPr lang="en-US" dirty="0"/>
+              <a:t>FAQ answer can contain HTML markup</a:t>
+            </a:r>
+          </a:p>
+          <a:p>
+            <a:r>
+              <a:rPr lang="en-US" dirty="0"/>
+              <a:t>FAQ is branding-aware (will use correct brand based on environment)</a:t>
+            </a:r>
+          </a:p>
+          <a:p>
+            <a:pPr lvl="1"/>
+            <a:r>
+              <a:rPr lang="en-US" dirty="0"/>
+              <a:t>All links should use relative paths (i.e., not include the domain name) to work with multiple brands</a:t>
+            </a:r>
+          </a:p>
+          <a:p>
+            <a:pPr lvl="1"/>
+            <a:r>
+              <a:rPr lang="en-US" dirty="0"/>
+              <a:t>%APP_NAME%: the name of the app</a:t>
+            </a:r>
+          </a:p>
+          <a:p>
+            <a:pPr lvl="1"/>
+            <a:r>
+              <a:rPr lang="en-US" dirty="0"/>
+              <a:t>%SHORT_DATE%: Current date format (short) - date pattern</a:t>
+            </a:r>
+          </a:p>
+          <a:p>
+            <a:pPr lvl="1"/>
+            <a:r>
+              <a:rPr lang="en-US" dirty="0"/>
+              <a:t>%DATE_TIME%: Current time format (long) - sample in long format</a:t>
+            </a:r>
+          </a:p>
+          <a:p>
+            <a:pPr lvl="1"/>
+            <a:r>
+              <a:rPr lang="en-US" dirty="0"/>
+              <a:t>%APP_URL%: the URL (host) for the current request.</a:t>
+            </a:r>
+          </a:p>
+          <a:p>
+            <a:pPr lvl="1"/>
+            <a:r>
+              <a:rPr lang="en-US" dirty="0"/>
+              <a:t>%APP_ROOT%: The root (analogous to "~") for the app brand.</a:t>
+            </a:r>
+          </a:p>
+          <a:p>
+            <a:pPr lvl="1"/>
+            <a:r>
+              <a:rPr lang="en-US" dirty="0"/>
+              <a:t>%APP_LOGO%: the URL for the app logo</a:t>
+            </a:r>
+          </a:p>
+          <a:p>
+            <a:pPr lvl="1"/>
+            <a:r>
+              <a:rPr lang="en-US" dirty="0"/>
+              <a:t>E.g., the “Contact” link is http://%APP_URL%%APP_ROOT%/Public/ContactMe.aspx which translates to http://myflightbook.com/logbook/Public/ContactMe.aspx</a:t>
+            </a:r>
+          </a:p>
+        </p:txBody>
+      </p:sp>
+    </p:spTree>
+    <p:extLst>
+      <p:ext uri="{BB962C8B-B14F-4D97-AF65-F5344CB8AC3E}">
+        <p14:creationId xmlns:p14="http://schemas.microsoft.com/office/powerpoint/2010/main" val="680066526"/>
+      </p:ext>
+    </p:extLst>
+  </p:cSld>
+  <p:clrMapOvr>
+    <a:masterClrMapping/>
+  </p:clrMapOvr>
+</p:sld>
+</file>
+
+<file path=ppt/slides/slide31.xml><?xml version="1.0" encoding="utf-8"?>
 <p:sld xmlns:a="http://schemas.openxmlformats.org/drawingml/2006/main" xmlns:r="http://schemas.openxmlformats.org/officeDocument/2006/relationships" xmlns:p="http://schemas.openxmlformats.org/presentationml/2006/main">
   <p:cSld>
     <p:spTree>
@@ -9013,7 +9308,7 @@
             <a:pPr lvl="1"/>
             <a:r>
               <a:rPr lang="en-US" dirty="0"/>
-              <a:t>Binary: if checked, this is something you achieve or you don’t achieve (and next items are ignored)</a:t>
+              <a:t>Binary: if checked, this is something you achieve or you don’t achieve (and subsequent items are ignored)</a:t>
             </a:r>
           </a:p>
           <a:p>
@@ -9043,86 +9338,6 @@
     <p:extLst>
       <p:ext uri="{BB962C8B-B14F-4D97-AF65-F5344CB8AC3E}">
         <p14:creationId xmlns:p14="http://schemas.microsoft.com/office/powerpoint/2010/main" val="3733485572"/>
-      </p:ext>
-    </p:extLst>
-  </p:cSld>
-  <p:clrMapOvr>
-    <a:masterClrMapping/>
-  </p:clrMapOvr>
-</p:sld>
-</file>
-
-<file path=ppt/slides/slide31.xml><?xml version="1.0" encoding="utf-8"?>
-<p:sld xmlns:a="http://schemas.openxmlformats.org/drawingml/2006/main" xmlns:r="http://schemas.openxmlformats.org/officeDocument/2006/relationships" xmlns:p="http://schemas.openxmlformats.org/presentationml/2006/main">
-  <p:cSld>
-    <p:spTree>
-      <p:nvGrpSpPr>
-        <p:cNvPr id="1" name=""/>
-        <p:cNvGrpSpPr/>
-        <p:nvPr/>
-      </p:nvGrpSpPr>
-      <p:grpSpPr>
-        <a:xfrm>
-          <a:off x="0" y="0"/>
-          <a:ext cx="0" cy="0"/>
-          <a:chOff x="0" y="0"/>
-          <a:chExt cx="0" cy="0"/>
-        </a:xfrm>
-      </p:grpSpPr>
-      <p:sp>
-        <p:nvSpPr>
-          <p:cNvPr id="2" name="Title 1"/>
-          <p:cNvSpPr>
-            <a:spLocks noGrp="1"/>
-          </p:cNvSpPr>
-          <p:nvPr>
-            <p:ph type="title"/>
-          </p:nvPr>
-        </p:nvSpPr>
-        <p:spPr/>
-        <p:txBody>
-          <a:bodyPr/>
-          <a:lstStyle/>
-          <a:p>
-            <a:r>
-              <a:rPr lang="en-US" dirty="0"/>
-              <a:t>Admin Tools: Telemetry</a:t>
-            </a:r>
-          </a:p>
-        </p:txBody>
-      </p:sp>
-      <p:sp>
-        <p:nvSpPr>
-          <p:cNvPr id="3" name="Content Placeholder 2"/>
-          <p:cNvSpPr>
-            <a:spLocks noGrp="1"/>
-          </p:cNvSpPr>
-          <p:nvPr>
-            <p:ph idx="1"/>
-          </p:nvPr>
-        </p:nvSpPr>
-        <p:spPr/>
-        <p:txBody>
-          <a:bodyPr/>
-          <a:lstStyle/>
-          <a:p>
-            <a:r>
-              <a:rPr lang="en-US" dirty="0"/>
-              <a:t>Allows migration of telemetry between database and individual disk files (similar to images and Amazon S3)</a:t>
-            </a:r>
-          </a:p>
-          <a:p>
-            <a:r>
-              <a:rPr lang="en-US" dirty="0"/>
-              <a:t>Can also reconcile data inconsistencies, and look up telemetry on a per-user basis and see stats.</a:t>
-            </a:r>
-          </a:p>
-        </p:txBody>
-      </p:sp>
-    </p:spTree>
-    <p:extLst>
-      <p:ext uri="{BB962C8B-B14F-4D97-AF65-F5344CB8AC3E}">
-        <p14:creationId xmlns:p14="http://schemas.microsoft.com/office/powerpoint/2010/main" val="3440863894"/>
       </p:ext>
     </p:extLst>
   </p:cSld>
@@ -9166,13 +9381,8 @@
           <a:p>
             <a:r>
               <a:rPr lang="en-US" dirty="0"/>
-              <a:t>Admin Tools: </a:t>
-            </a:r>
-            <a:r>
-              <a:rPr lang="en-US" dirty="0" err="1"/>
-              <a:t>Misc</a:t>
-            </a:r>
-            <a:endParaRPr lang="en-US" dirty="0"/>
+              <a:t>Admin Tools: Telemetry</a:t>
+            </a:r>
           </a:p>
         </p:txBody>
       </p:sp>
@@ -9188,55 +9398,18 @@
         </p:nvSpPr>
         <p:spPr/>
         <p:txBody>
-          <a:bodyPr>
-            <a:normAutofit fontScale="92500" lnSpcReduction="20000"/>
-          </a:bodyPr>
-          <a:lstStyle/>
-          <a:p>
-            <a:r>
-              <a:rPr lang="en-US" dirty="0"/>
-              <a:t>Handle duplicate/empty properties</a:t>
-            </a:r>
-          </a:p>
-          <a:p>
-            <a:pPr lvl="1"/>
-            <a:r>
-              <a:rPr lang="en-US" dirty="0"/>
-              <a:t>Just click them to view them in context and delete them (obviously only one in the case of duplicates).</a:t>
-            </a:r>
-          </a:p>
-          <a:p>
-            <a:pPr lvl="1"/>
-            <a:r>
-              <a:rPr lang="en-US" dirty="0"/>
-              <a:t>I confess I’m not quite sure how these happen</a:t>
-            </a:r>
-          </a:p>
-          <a:p>
-            <a:r>
-              <a:rPr lang="en-US" dirty="0"/>
-              <a:t>Investigate/</a:t>
-            </a:r>
-            <a:r>
-              <a:rPr lang="en-US" dirty="0" err="1"/>
-              <a:t>recompute</a:t>
-            </a:r>
-            <a:r>
-              <a:rPr lang="en-US" dirty="0"/>
-              <a:t> invalid signatures (slow!)</a:t>
-            </a:r>
-          </a:p>
-          <a:p>
-            <a:pPr lvl="1"/>
-            <a:r>
-              <a:rPr lang="en-US" dirty="0"/>
-              <a:t>Can arise if aircraft changes (e.g., clone or merging of duplicate aircraft)</a:t>
-            </a:r>
-          </a:p>
-          <a:p>
-            <a:r>
-              <a:rPr lang="en-US" dirty="0"/>
-              <a:t>Flush the cache on the live site (to pick up DB changes)</a:t>
+          <a:bodyPr/>
+          <a:lstStyle/>
+          <a:p>
+            <a:r>
+              <a:rPr lang="en-US" dirty="0"/>
+              <a:t>Allows migration of telemetry between database and individual disk files (similar to images and Amazon S3)</a:t>
+            </a:r>
+          </a:p>
+          <a:p>
+            <a:r>
+              <a:rPr lang="en-US" dirty="0"/>
+              <a:t>Can also reconcile data inconsistencies, and look up telemetry on a per-user basis and see stats.</a:t>
             </a:r>
           </a:p>
         </p:txBody>
@@ -9244,7 +9417,7 @@
     </p:spTree>
     <p:extLst>
       <p:ext uri="{BB962C8B-B14F-4D97-AF65-F5344CB8AC3E}">
-        <p14:creationId xmlns:p14="http://schemas.microsoft.com/office/powerpoint/2010/main" val="2007248668"/>
+        <p14:creationId xmlns:p14="http://schemas.microsoft.com/office/powerpoint/2010/main" val="3440863894"/>
       </p:ext>
     </p:extLst>
   </p:cSld>
@@ -9273,12 +9446,12 @@
       </p:grpSpPr>
       <p:sp>
         <p:nvSpPr>
-          <p:cNvPr id="4" name="Title 3"/>
-          <p:cNvSpPr>
-            <a:spLocks noGrp="1"/>
-          </p:cNvSpPr>
-          <p:nvPr>
-            <p:ph type="ctrTitle"/>
+          <p:cNvPr id="2" name="Title 1"/>
+          <p:cNvSpPr>
+            <a:spLocks noGrp="1"/>
+          </p:cNvSpPr>
+          <p:nvPr>
+            <p:ph type="title"/>
           </p:nvPr>
         </p:nvSpPr>
         <p:spPr/>
@@ -9288,34 +9461,92 @@
           <a:p>
             <a:r>
               <a:rPr lang="en-US" dirty="0"/>
-              <a:t>Reporting</a:t>
-            </a:r>
-          </a:p>
-        </p:txBody>
-      </p:sp>
-      <p:sp>
-        <p:nvSpPr>
-          <p:cNvPr id="5" name="Subtitle 4"/>
-          <p:cNvSpPr>
-            <a:spLocks noGrp="1"/>
-          </p:cNvSpPr>
-          <p:nvPr>
-            <p:ph type="subTitle" idx="1"/>
+              <a:t>Admin Tools: </a:t>
+            </a:r>
+            <a:r>
+              <a:rPr lang="en-US" dirty="0" err="1"/>
+              <a:t>Misc</a:t>
+            </a:r>
+            <a:endParaRPr lang="en-US" dirty="0"/>
+          </a:p>
+        </p:txBody>
+      </p:sp>
+      <p:sp>
+        <p:nvSpPr>
+          <p:cNvPr id="3" name="Content Placeholder 2"/>
+          <p:cNvSpPr>
+            <a:spLocks noGrp="1"/>
+          </p:cNvSpPr>
+          <p:nvPr>
+            <p:ph idx="1"/>
           </p:nvPr>
         </p:nvSpPr>
         <p:spPr/>
         <p:txBody>
-          <a:bodyPr/>
-          <a:lstStyle/>
-          <a:p>
-            <a:endParaRPr lang="en-US"/>
+          <a:bodyPr>
+            <a:normAutofit fontScale="85000" lnSpcReduction="10000"/>
+          </a:bodyPr>
+          <a:lstStyle/>
+          <a:p>
+            <a:r>
+              <a:rPr lang="en-US" dirty="0"/>
+              <a:t>Handle duplicate/empty properties</a:t>
+            </a:r>
+          </a:p>
+          <a:p>
+            <a:pPr lvl="1"/>
+            <a:r>
+              <a:rPr lang="en-US" dirty="0"/>
+              <a:t>Just click them to view them in context and delete them (obviously only one in the case of duplicates).</a:t>
+            </a:r>
+          </a:p>
+          <a:p>
+            <a:pPr lvl="1"/>
+            <a:r>
+              <a:rPr lang="en-US" dirty="0"/>
+              <a:t>I think I’ve finally caught all the scenarios where this can happen; haven’t seen dupes in a while</a:t>
+            </a:r>
+          </a:p>
+          <a:p>
+            <a:r>
+              <a:rPr lang="en-US" dirty="0"/>
+              <a:t>Investigate/</a:t>
+            </a:r>
+            <a:r>
+              <a:rPr lang="en-US" dirty="0" err="1"/>
+              <a:t>recompute</a:t>
+            </a:r>
+            <a:r>
+              <a:rPr lang="en-US" dirty="0"/>
+              <a:t> invalid signatures (slow!)</a:t>
+            </a:r>
+          </a:p>
+          <a:p>
+            <a:pPr lvl="1"/>
+            <a:r>
+              <a:rPr lang="en-US" dirty="0"/>
+              <a:t>Can arise if aircraft changes (e.g., clone or merging of duplicate aircraft)</a:t>
+            </a:r>
+          </a:p>
+          <a:p>
+            <a:pPr lvl="1"/>
+            <a:r>
+              <a:rPr lang="en-US" dirty="0"/>
+              <a:t>Best to do this on a development machine first.</a:t>
+            </a:r>
+          </a:p>
+          <a:p>
+            <a:r>
+              <a:rPr lang="en-US" dirty="0"/>
+              <a:t>Flush the cache on the live site (to pick up DB changes)</a:t>
+            </a:r>
           </a:p>
         </p:txBody>
       </p:sp>
     </p:spTree>
     <p:extLst>
       <p:ext uri="{BB962C8B-B14F-4D97-AF65-F5344CB8AC3E}">
-        <p14:creationId xmlns:p14="http://schemas.microsoft.com/office/powerpoint/2010/main" val="3700926872"/>
+        <p14:creationId xmlns:p14="http://schemas.microsoft.com/office/powerpoint/2010/main" val="2007248668"/>
       </p:ext>
     </p:extLst>
   </p:cSld>
@@ -9344,12 +9575,12 @@
       </p:grpSpPr>
       <p:sp>
         <p:nvSpPr>
-          <p:cNvPr id="2" name="Title 1"/>
-          <p:cNvSpPr>
-            <a:spLocks noGrp="1"/>
-          </p:cNvSpPr>
-          <p:nvPr>
-            <p:ph type="title"/>
+          <p:cNvPr id="4" name="Title 3"/>
+          <p:cNvSpPr>
+            <a:spLocks noGrp="1"/>
+          </p:cNvSpPr>
+          <p:nvPr>
+            <p:ph type="ctrTitle"/>
           </p:nvPr>
         </p:nvSpPr>
         <p:spPr/>
@@ -9359,19 +9590,19 @@
           <a:p>
             <a:r>
               <a:rPr lang="en-US" dirty="0"/>
-              <a:t>Donations</a:t>
-            </a:r>
-          </a:p>
-        </p:txBody>
-      </p:sp>
-      <p:sp>
-        <p:nvSpPr>
-          <p:cNvPr id="3" name="Content Placeholder 2"/>
-          <p:cNvSpPr>
-            <a:spLocks noGrp="1"/>
-          </p:cNvSpPr>
-          <p:nvPr>
-            <p:ph idx="1"/>
+              <a:t>Reporting</a:t>
+            </a:r>
+          </a:p>
+        </p:txBody>
+      </p:sp>
+      <p:sp>
+        <p:nvSpPr>
+          <p:cNvPr id="5" name="Subtitle 4"/>
+          <p:cNvSpPr>
+            <a:spLocks noGrp="1"/>
+          </p:cNvSpPr>
+          <p:nvPr>
+            <p:ph type="subTitle" idx="1"/>
           </p:nvPr>
         </p:nvSpPr>
         <p:spPr/>
@@ -9379,36 +9610,14 @@
           <a:bodyPr/>
           <a:lstStyle/>
           <a:p>
-            <a:r>
-              <a:rPr lang="en-US" dirty="0"/>
-              <a:t>View details of donations made by time period</a:t>
-            </a:r>
-          </a:p>
-          <a:p>
-            <a:r>
-              <a:rPr lang="en-US" dirty="0"/>
-              <a:t>Search for donations by username</a:t>
-            </a:r>
-          </a:p>
-          <a:p>
-            <a:r>
-              <a:rPr lang="en-US" dirty="0"/>
-              <a:t>Add transactions manually to make adjustments </a:t>
-            </a:r>
-          </a:p>
-          <a:p>
-            <a:pPr lvl="1"/>
-            <a:r>
-              <a:rPr lang="en-US" dirty="0"/>
-              <a:t>Does NOT issue refunds!!  This is just local recordkeeping</a:t>
-            </a:r>
+            <a:endParaRPr lang="en-US"/>
           </a:p>
         </p:txBody>
       </p:sp>
     </p:spTree>
     <p:extLst>
       <p:ext uri="{BB962C8B-B14F-4D97-AF65-F5344CB8AC3E}">
-        <p14:creationId xmlns:p14="http://schemas.microsoft.com/office/powerpoint/2010/main" val="762305122"/>
+        <p14:creationId xmlns:p14="http://schemas.microsoft.com/office/powerpoint/2010/main" val="3700926872"/>
       </p:ext>
     </p:extLst>
   </p:cSld>
@@ -9452,7 +9661,7 @@
           <a:p>
             <a:r>
               <a:rPr lang="en-US" dirty="0"/>
-              <a:t>Admin Tools: Stats</a:t>
+              <a:t>Donations</a:t>
             </a:r>
           </a:p>
         </p:txBody>
@@ -9474,24 +9683,34 @@
           <a:p>
             <a:r>
               <a:rPr lang="en-US" dirty="0"/>
-              <a:t>Displays some interesting usage statistics for the site.</a:t>
-            </a:r>
-          </a:p>
-          <a:p>
-            <a:r>
-              <a:rPr lang="en-US" dirty="0"/>
-              <a:t>No actions necessary in this section</a:t>
-            </a:r>
-          </a:p>
-          <a:p>
-            <a:endParaRPr lang="en-US" dirty="0"/>
+              <a:t>View details of donations made by time period</a:t>
+            </a:r>
+          </a:p>
+          <a:p>
+            <a:r>
+              <a:rPr lang="en-US" dirty="0"/>
+              <a:t>Search for donations by username</a:t>
+            </a:r>
+          </a:p>
+          <a:p>
+            <a:r>
+              <a:rPr lang="en-US" dirty="0"/>
+              <a:t>Add transactions manually to make adjustments </a:t>
+            </a:r>
+          </a:p>
+          <a:p>
+            <a:pPr lvl="1"/>
+            <a:r>
+              <a:rPr lang="en-US" dirty="0"/>
+              <a:t>Does NOT issue refunds!!  This is just local recordkeeping</a:t>
+            </a:r>
           </a:p>
         </p:txBody>
       </p:sp>
     </p:spTree>
     <p:extLst>
       <p:ext uri="{BB962C8B-B14F-4D97-AF65-F5344CB8AC3E}">
-        <p14:creationId xmlns:p14="http://schemas.microsoft.com/office/powerpoint/2010/main" val="2703966438"/>
+        <p14:creationId xmlns:p14="http://schemas.microsoft.com/office/powerpoint/2010/main" val="762305122"/>
       </p:ext>
     </p:extLst>
   </p:cSld>
@@ -9525,7 +9744,7 @@
             <a:spLocks noGrp="1"/>
           </p:cNvSpPr>
           <p:nvPr>
-            <p:ph type="ctrTitle"/>
+            <p:ph type="title"/>
           </p:nvPr>
         </p:nvSpPr>
         <p:spPr/>
@@ -9534,36 +9753,59 @@
           <a:lstStyle/>
           <a:p>
             <a:r>
-              <a:rPr lang="en-US" dirty="0" err="1"/>
-              <a:t>Misc</a:t>
-            </a:r>
+              <a:rPr lang="en-US" dirty="0"/>
+              <a:t>Admin Tools: Stats</a:t>
+            </a:r>
+          </a:p>
+        </p:txBody>
+      </p:sp>
+      <p:sp>
+        <p:nvSpPr>
+          <p:cNvPr id="3" name="Content Placeholder 2"/>
+          <p:cNvSpPr>
+            <a:spLocks noGrp="1"/>
+          </p:cNvSpPr>
+          <p:nvPr>
+            <p:ph idx="1"/>
+          </p:nvPr>
+        </p:nvSpPr>
+        <p:spPr/>
+        <p:txBody>
+          <a:bodyPr/>
+          <a:lstStyle/>
+          <a:p>
+            <a:r>
+              <a:rPr lang="en-US" dirty="0"/>
+              <a:t>Displays some interesting usage statistics for the site.</a:t>
+            </a:r>
+          </a:p>
+          <a:p>
+            <a:r>
+              <a:rPr lang="en-US" dirty="0"/>
+              <a:t>No actions necessary in this section</a:t>
+            </a:r>
+          </a:p>
+          <a:p>
+            <a:r>
+              <a:rPr lang="en-US" dirty="0"/>
+              <a:t>Emailed nightly</a:t>
+            </a:r>
+          </a:p>
+          <a:p>
+            <a:r>
+              <a:rPr lang="en-US" dirty="0"/>
+              <a:t>SLOW to compute</a:t>
+            </a:r>
+          </a:p>
+          <a:p>
             <a:endParaRPr lang="en-US" dirty="0"/>
-          </a:p>
-        </p:txBody>
-      </p:sp>
-      <p:sp>
-        <p:nvSpPr>
-          <p:cNvPr id="3" name="Subtitle 2"/>
-          <p:cNvSpPr>
-            <a:spLocks noGrp="1"/>
-          </p:cNvSpPr>
-          <p:nvPr>
-            <p:ph type="subTitle" idx="1"/>
-          </p:nvPr>
-        </p:nvSpPr>
-        <p:spPr/>
-        <p:txBody>
-          <a:bodyPr/>
-          <a:lstStyle/>
-          <a:p>
-            <a:endParaRPr lang="en-US"/>
           </a:p>
         </p:txBody>
       </p:sp>
     </p:spTree>
     <p:extLst>
       <p:ext uri="{BB962C8B-B14F-4D97-AF65-F5344CB8AC3E}">
-        <p14:creationId xmlns:p14="http://schemas.microsoft.com/office/powerpoint/2010/main" val="73007954"/>
+        <p14:creationId xmlns:p14="http://schemas.microsoft.com/office/powerpoint/2010/main" val="2703966438"/>
       </p:ext>
     </p:extLst>
   </p:cSld>
@@ -9597,7 +9839,7 @@
             <a:spLocks noGrp="1"/>
           </p:cNvSpPr>
           <p:nvPr>
-            <p:ph type="title"/>
+            <p:ph type="ctrTitle"/>
           </p:nvPr>
         </p:nvSpPr>
         <p:spPr/>
@@ -9606,20 +9848,21 @@
           <a:lstStyle/>
           <a:p>
             <a:r>
-              <a:rPr lang="en-US" dirty="0"/>
-              <a:t>Shunting the site</a:t>
-            </a:r>
-          </a:p>
-        </p:txBody>
-      </p:sp>
-      <p:sp>
-        <p:nvSpPr>
-          <p:cNvPr id="3" name="Content Placeholder 2"/>
-          <p:cNvSpPr>
-            <a:spLocks noGrp="1"/>
-          </p:cNvSpPr>
-          <p:nvPr>
-            <p:ph idx="1"/>
+              <a:rPr lang="en-US" dirty="0" err="1"/>
+              <a:t>Misc</a:t>
+            </a:r>
+            <a:endParaRPr lang="en-US" dirty="0"/>
+          </a:p>
+        </p:txBody>
+      </p:sp>
+      <p:sp>
+        <p:nvSpPr>
+          <p:cNvPr id="3" name="Subtitle 2"/>
+          <p:cNvSpPr>
+            <a:spLocks noGrp="1"/>
+          </p:cNvSpPr>
+          <p:nvPr>
+            <p:ph type="subTitle" idx="1"/>
           </p:nvPr>
         </p:nvSpPr>
         <p:spPr/>
@@ -9627,37 +9870,14 @@
           <a:bodyPr/>
           <a:lstStyle/>
           <a:p>
-            <a:r>
-              <a:rPr lang="en-US" dirty="0"/>
-              <a:t>LAST RESORT – CALL ME</a:t>
-            </a:r>
-          </a:p>
-          <a:p>
-            <a:r>
-              <a:rPr lang="en-US" dirty="0"/>
-              <a:t>Site can be shunted if necessary</a:t>
-            </a:r>
-          </a:p>
-          <a:p>
-            <a:r>
-              <a:rPr lang="en-US" dirty="0"/>
-              <a:t>Requires editing </a:t>
-            </a:r>
-            <a:r>
-              <a:rPr lang="en-US" dirty="0" err="1"/>
-              <a:t>Web.config</a:t>
-            </a:r>
-            <a:r>
-              <a:rPr lang="en-US" dirty="0"/>
-              <a:t> on live site.  Search for word “Shunt” and you’ll see what to do.  Save the change.  Undo it to un-shunt</a:t>
-            </a:r>
+            <a:endParaRPr lang="en-US"/>
           </a:p>
         </p:txBody>
       </p:sp>
     </p:spTree>
     <p:extLst>
       <p:ext uri="{BB962C8B-B14F-4D97-AF65-F5344CB8AC3E}">
-        <p14:creationId xmlns:p14="http://schemas.microsoft.com/office/powerpoint/2010/main" val="3705413828"/>
+        <p14:creationId xmlns:p14="http://schemas.microsoft.com/office/powerpoint/2010/main" val="73007954"/>
       </p:ext>
     </p:extLst>
   </p:cSld>
@@ -9701,7 +9921,7 @@
           <a:p>
             <a:r>
               <a:rPr lang="en-US" dirty="0"/>
-              <a:t>Accounts</a:t>
+              <a:t>Shunting the site</a:t>
             </a:r>
           </a:p>
         </p:txBody>
@@ -9723,11 +9943,27 @@
           <a:p>
             <a:r>
               <a:rPr lang="en-US" dirty="0"/>
-              <a:t>Amazon S3 is under the </a:t>
-            </a:r>
-            <a:r>
-              <a:rPr lang="en-US"/>
-              <a:t>account MyFlightbook@hothpark.com.</a:t>
+              <a:t>LAST RESORT – CALL ME</a:t>
+            </a:r>
+          </a:p>
+          <a:p>
+            <a:r>
+              <a:rPr lang="en-US" dirty="0"/>
+              <a:t>Site can be shunted if necessary</a:t>
+            </a:r>
+          </a:p>
+          <a:p>
+            <a:r>
+              <a:rPr lang="en-US" dirty="0"/>
+              <a:t>Requires editing </a:t>
+            </a:r>
+            <a:r>
+              <a:rPr lang="en-US" dirty="0" err="1"/>
+              <a:t>Web.config</a:t>
+            </a:r>
+            <a:r>
+              <a:rPr lang="en-US" dirty="0"/>
+              <a:t> on live site.  Search for word “Shunt” and you’ll see what to do.  Save the change.  Undo it to un-shunt</a:t>
             </a:r>
           </a:p>
         </p:txBody>
@@ -9735,7 +9971,7 @@
     </p:spTree>
     <p:extLst>
       <p:ext uri="{BB962C8B-B14F-4D97-AF65-F5344CB8AC3E}">
-        <p14:creationId xmlns:p14="http://schemas.microsoft.com/office/powerpoint/2010/main" val="3619283229"/>
+        <p14:creationId xmlns:p14="http://schemas.microsoft.com/office/powerpoint/2010/main" val="3705413828"/>
       </p:ext>
     </p:extLst>
   </p:cSld>
@@ -10165,7 +10401,14 @@
           <a:p>
             <a:r>
               <a:rPr lang="en-US" dirty="0"/>
-              <a:t>New User – can ignore/delete, but is good indicator of health of site</a:t>
+              <a:t>New User – can ignore/delete, but is good indicator of health of site </a:t>
+            </a:r>
+          </a:p>
+          <a:p>
+            <a:pPr lvl="1"/>
+            <a:r>
+              <a:rPr lang="en-US" dirty="0"/>
+              <a:t>I have a rule to move to a separate folder</a:t>
             </a:r>
           </a:p>
           <a:p>
@@ -10227,6 +10470,23 @@
             <a:pPr lvl="2"/>
             <a:r>
               <a:rPr lang="en-US" dirty="0"/>
+              <a:t>Incorrect or missing ICAO identifier (I use </a:t>
+            </a:r>
+            <a:r>
+              <a:rPr lang="en-US" dirty="0">
+                <a:hlinkClick r:id="rId2"/>
+              </a:rPr>
+              <a:t>https://www.icao.int/publications/DOC8643/Pages/Search.aspx</a:t>
+            </a:r>
+            <a:r>
+              <a:rPr lang="en-US" dirty="0"/>
+              <a:t> to look up)</a:t>
+            </a:r>
+          </a:p>
+          <a:p>
+            <a:pPr lvl="2"/>
+            <a:r>
+              <a:rPr lang="en-US" dirty="0"/>
               <a:t>Duplicates of other models</a:t>
             </a:r>
           </a:p>
@@ -10248,14 +10508,7 @@
           <a:p>
             <a:r>
               <a:rPr lang="en-US" dirty="0"/>
-              <a:t>Edit to an aircraft that is shared among users</a:t>
-            </a:r>
-          </a:p>
-          <a:p>
-            <a:pPr lvl="1"/>
-            <a:r>
-              <a:rPr lang="en-US" dirty="0"/>
-              <a:t>Contains a link to admin-enabled version of aircraft page.</a:t>
+              <a:t>Edit to or clone of an aircraft that is shared among users</a:t>
             </a:r>
           </a:p>
           <a:p>

</xml_diff>

<commit_message>
SVN 6610: Do some initial refactoring of Profile into ProfileBase and Profile to reduce class coupling.
Also removed change username.  With foreign key constraints in database, this doesn't work anyhow.
</commit_message>
<xml_diff>
--- a/Private/MyFlightbook Admin Tools.pptx
+++ b/Private/MyFlightbook Admin Tools.pptx
@@ -5,10 +5,10 @@
     <p:sldMasterId id="2147483660" r:id="rId1"/>
   </p:sldMasterIdLst>
   <p:notesMasterIdLst>
-    <p:notesMasterId r:id="rId42"/>
+    <p:notesMasterId r:id="rId41"/>
   </p:notesMasterIdLst>
   <p:handoutMasterIdLst>
-    <p:handoutMasterId r:id="rId43"/>
+    <p:handoutMasterId r:id="rId42"/>
   </p:handoutMasterIdLst>
   <p:sldIdLst>
     <p:sldId id="256" r:id="rId2"/>
@@ -22,35 +22,34 @@
     <p:sldId id="278" r:id="rId10"/>
     <p:sldId id="260" r:id="rId11"/>
     <p:sldId id="264" r:id="rId12"/>
-    <p:sldId id="291" r:id="rId13"/>
-    <p:sldId id="275" r:id="rId14"/>
-    <p:sldId id="266" r:id="rId15"/>
-    <p:sldId id="292" r:id="rId16"/>
-    <p:sldId id="263" r:id="rId17"/>
-    <p:sldId id="261" r:id="rId18"/>
-    <p:sldId id="262" r:id="rId19"/>
-    <p:sldId id="265" r:id="rId20"/>
-    <p:sldId id="293" r:id="rId21"/>
-    <p:sldId id="302" r:id="rId22"/>
-    <p:sldId id="294" r:id="rId23"/>
-    <p:sldId id="280" r:id="rId24"/>
-    <p:sldId id="282" r:id="rId25"/>
-    <p:sldId id="283" r:id="rId26"/>
-    <p:sldId id="295" r:id="rId27"/>
-    <p:sldId id="296" r:id="rId28"/>
-    <p:sldId id="297" r:id="rId29"/>
-    <p:sldId id="268" r:id="rId30"/>
-    <p:sldId id="279" r:id="rId31"/>
-    <p:sldId id="298" r:id="rId32"/>
-    <p:sldId id="300" r:id="rId33"/>
-    <p:sldId id="301" r:id="rId34"/>
-    <p:sldId id="274" r:id="rId35"/>
-    <p:sldId id="299" r:id="rId36"/>
-    <p:sldId id="269" r:id="rId37"/>
-    <p:sldId id="286" r:id="rId38"/>
-    <p:sldId id="270" r:id="rId39"/>
-    <p:sldId id="285" r:id="rId40"/>
-    <p:sldId id="287" r:id="rId41"/>
+    <p:sldId id="275" r:id="rId13"/>
+    <p:sldId id="266" r:id="rId14"/>
+    <p:sldId id="292" r:id="rId15"/>
+    <p:sldId id="263" r:id="rId16"/>
+    <p:sldId id="261" r:id="rId17"/>
+    <p:sldId id="262" r:id="rId18"/>
+    <p:sldId id="265" r:id="rId19"/>
+    <p:sldId id="293" r:id="rId20"/>
+    <p:sldId id="302" r:id="rId21"/>
+    <p:sldId id="294" r:id="rId22"/>
+    <p:sldId id="280" r:id="rId23"/>
+    <p:sldId id="282" r:id="rId24"/>
+    <p:sldId id="283" r:id="rId25"/>
+    <p:sldId id="295" r:id="rId26"/>
+    <p:sldId id="296" r:id="rId27"/>
+    <p:sldId id="297" r:id="rId28"/>
+    <p:sldId id="268" r:id="rId29"/>
+    <p:sldId id="279" r:id="rId30"/>
+    <p:sldId id="298" r:id="rId31"/>
+    <p:sldId id="300" r:id="rId32"/>
+    <p:sldId id="301" r:id="rId33"/>
+    <p:sldId id="274" r:id="rId34"/>
+    <p:sldId id="299" r:id="rId35"/>
+    <p:sldId id="269" r:id="rId36"/>
+    <p:sldId id="286" r:id="rId37"/>
+    <p:sldId id="270" r:id="rId38"/>
+    <p:sldId id="285" r:id="rId39"/>
+    <p:sldId id="287" r:id="rId40"/>
   </p:sldIdLst>
   <p:sldSz cx="9144000" cy="6858000" type="screen4x3"/>
   <p:notesSz cx="6858000" cy="9144000"/>
@@ -264,7 +263,7 @@
           <a:p>
             <a:fld id="{E7CA5475-1311-45DC-B51B-D3E435D31F4C}" type="datetimeFigureOut">
               <a:rPr lang="en-US" smtClean="0"/>
-              <a:t>10/21/2018</a:t>
+              <a:t>5/14/2019</a:t>
             </a:fld>
             <a:endParaRPr lang="en-US"/>
           </a:p>
@@ -429,7 +428,7 @@
           <a:p>
             <a:fld id="{06674F5A-56E8-40A4-BD50-7225B14DC1C7}" type="datetimeFigureOut">
               <a:rPr lang="en-US" smtClean="0"/>
-              <a:t>10/21/2018</a:t>
+              <a:t>5/14/2019</a:t>
             </a:fld>
             <a:endParaRPr lang="en-US"/>
           </a:p>
@@ -761,7 +760,7 @@
           <a:p>
             <a:fld id="{D83FC427-6163-425D-84EB-576E7AD9931B}" type="slidenum">
               <a:rPr lang="en-US" smtClean="0"/>
-              <a:t>19</a:t>
+              <a:t>18</a:t>
             </a:fld>
             <a:endParaRPr lang="en-US"/>
           </a:p>
@@ -959,7 +958,7 @@
           <a:p>
             <a:fld id="{1AE20A72-B8E1-46A7-AC63-F989E9C837CC}" type="datetimeFigureOut">
               <a:rPr lang="en-US" smtClean="0"/>
-              <a:t>10/21/2018</a:t>
+              <a:t>5/14/2019</a:t>
             </a:fld>
             <a:endParaRPr lang="en-US"/>
           </a:p>
@@ -1127,7 +1126,7 @@
           <a:p>
             <a:fld id="{1AE20A72-B8E1-46A7-AC63-F989E9C837CC}" type="datetimeFigureOut">
               <a:rPr lang="en-US" smtClean="0"/>
-              <a:t>10/21/2018</a:t>
+              <a:t>5/14/2019</a:t>
             </a:fld>
             <a:endParaRPr lang="en-US"/>
           </a:p>
@@ -1305,7 +1304,7 @@
           <a:p>
             <a:fld id="{1AE20A72-B8E1-46A7-AC63-F989E9C837CC}" type="datetimeFigureOut">
               <a:rPr lang="en-US" smtClean="0"/>
-              <a:t>10/21/2018</a:t>
+              <a:t>5/14/2019</a:t>
             </a:fld>
             <a:endParaRPr lang="en-US"/>
           </a:p>
@@ -1486,7 +1485,7 @@
           <a:p>
             <a:fld id="{1AE20A72-B8E1-46A7-AC63-F989E9C837CC}" type="datetimeFigureOut">
               <a:rPr lang="en-US" smtClean="0"/>
-              <a:t>10/21/2018</a:t>
+              <a:t>5/14/2019</a:t>
             </a:fld>
             <a:endParaRPr lang="en-US"/>
           </a:p>
@@ -1731,7 +1730,7 @@
           <a:p>
             <a:fld id="{1AE20A72-B8E1-46A7-AC63-F989E9C837CC}" type="datetimeFigureOut">
               <a:rPr lang="en-US" smtClean="0"/>
-              <a:t>10/21/2018</a:t>
+              <a:t>5/14/2019</a:t>
             </a:fld>
             <a:endParaRPr lang="en-US"/>
           </a:p>
@@ -2016,7 +2015,7 @@
           <a:p>
             <a:fld id="{1AE20A72-B8E1-46A7-AC63-F989E9C837CC}" type="datetimeFigureOut">
               <a:rPr lang="en-US" smtClean="0"/>
-              <a:t>10/21/2018</a:t>
+              <a:t>5/14/2019</a:t>
             </a:fld>
             <a:endParaRPr lang="en-US"/>
           </a:p>
@@ -2435,7 +2434,7 @@
           <a:p>
             <a:fld id="{1AE20A72-B8E1-46A7-AC63-F989E9C837CC}" type="datetimeFigureOut">
               <a:rPr lang="en-US" smtClean="0"/>
-              <a:t>10/21/2018</a:t>
+              <a:t>5/14/2019</a:t>
             </a:fld>
             <a:endParaRPr lang="en-US"/>
           </a:p>
@@ -2552,7 +2551,7 @@
           <a:p>
             <a:fld id="{1AE20A72-B8E1-46A7-AC63-F989E9C837CC}" type="datetimeFigureOut">
               <a:rPr lang="en-US" smtClean="0"/>
-              <a:t>10/21/2018</a:t>
+              <a:t>5/14/2019</a:t>
             </a:fld>
             <a:endParaRPr lang="en-US"/>
           </a:p>
@@ -2647,7 +2646,7 @@
           <a:p>
             <a:fld id="{1AE20A72-B8E1-46A7-AC63-F989E9C837CC}" type="datetimeFigureOut">
               <a:rPr lang="en-US" smtClean="0"/>
-              <a:t>10/21/2018</a:t>
+              <a:t>5/14/2019</a:t>
             </a:fld>
             <a:endParaRPr lang="en-US"/>
           </a:p>
@@ -2922,7 +2921,7 @@
           <a:p>
             <a:fld id="{1AE20A72-B8E1-46A7-AC63-F989E9C837CC}" type="datetimeFigureOut">
               <a:rPr lang="en-US" smtClean="0"/>
-              <a:t>10/21/2018</a:t>
+              <a:t>5/14/2019</a:t>
             </a:fld>
             <a:endParaRPr lang="en-US"/>
           </a:p>
@@ -3177,7 +3176,7 @@
           <a:p>
             <a:fld id="{1AE20A72-B8E1-46A7-AC63-F989E9C837CC}" type="datetimeFigureOut">
               <a:rPr lang="en-US" smtClean="0"/>
-              <a:t>10/21/2018</a:t>
+              <a:t>5/14/2019</a:t>
             </a:fld>
             <a:endParaRPr lang="en-US"/>
           </a:p>
@@ -3389,7 +3388,7 @@
           <a:p>
             <a:fld id="{1AE20A72-B8E1-46A7-AC63-F989E9C837CC}" type="datetimeFigureOut">
               <a:rPr lang="en-US" smtClean="0"/>
-              <a:t>10/21/2018</a:t>
+              <a:t>5/14/2019</a:t>
             </a:fld>
             <a:endParaRPr lang="en-US"/>
           </a:p>
@@ -3948,14 +3947,20 @@
       </p:sp>
       <p:pic>
         <p:nvPicPr>
-          <p:cNvPr id="4" name="Picture 3"/>
+          <p:cNvPr id="6" name="Picture 5">
+            <a:extLst>
+              <a:ext uri="{FF2B5EF4-FFF2-40B4-BE49-F238E27FC236}">
+                <a16:creationId xmlns:a16="http://schemas.microsoft.com/office/drawing/2014/main" id="{CC89C027-5977-420C-B915-BC52654AA9A9}"/>
+              </a:ext>
+            </a:extLst>
+          </p:cNvPr>
           <p:cNvPicPr>
             <a:picLocks noChangeAspect="1"/>
           </p:cNvPicPr>
           <p:nvPr/>
         </p:nvPicPr>
         <p:blipFill rotWithShape="1">
-          <a:blip r:embed="rId2" cstate="screen">
+          <a:blip r:embed="rId2" cstate="email">
             <a:extLst>
               <a:ext uri="{28A0092B-C50C-407E-A947-70E740481C1C}">
                 <a14:useLocalDpi xmlns:a14="http://schemas.microsoft.com/office/drawing/2010/main"/>
@@ -3967,8 +3972,8 @@
         </p:blipFill>
         <p:spPr>
           <a:xfrm>
-            <a:off x="638175" y="3505200"/>
-            <a:ext cx="7715250" cy="1295400"/>
+            <a:off x="468682" y="4343400"/>
+            <a:ext cx="8093780" cy="825674"/>
           </a:xfrm>
           <a:prstGeom prst="rect">
             <a:avLst/>
@@ -4137,107 +4142,6 @@
       </p:grpSpPr>
       <p:sp>
         <p:nvSpPr>
-          <p:cNvPr id="2" name="Title 1"/>
-          <p:cNvSpPr>
-            <a:spLocks noGrp="1"/>
-          </p:cNvSpPr>
-          <p:nvPr>
-            <p:ph type="title"/>
-          </p:nvPr>
-        </p:nvSpPr>
-        <p:spPr/>
-        <p:txBody>
-          <a:bodyPr/>
-          <a:lstStyle/>
-          <a:p>
-            <a:r>
-              <a:rPr lang="en-US" dirty="0"/>
-              <a:t>Admin Tools: User Management</a:t>
-            </a:r>
-          </a:p>
-        </p:txBody>
-      </p:sp>
-      <p:sp>
-        <p:nvSpPr>
-          <p:cNvPr id="3" name="Content Placeholder 2"/>
-          <p:cNvSpPr>
-            <a:spLocks noGrp="1"/>
-          </p:cNvSpPr>
-          <p:nvPr>
-            <p:ph idx="1"/>
-          </p:nvPr>
-        </p:nvSpPr>
-        <p:spPr/>
-        <p:txBody>
-          <a:bodyPr/>
-          <a:lstStyle/>
-          <a:p>
-            <a:r>
-              <a:rPr lang="en-US" dirty="0"/>
-              <a:t>Can also change username.  No real reason to use this.</a:t>
-            </a:r>
-          </a:p>
-          <a:p>
-            <a:endParaRPr lang="en-US" dirty="0"/>
-          </a:p>
-        </p:txBody>
-      </p:sp>
-      <p:pic>
-        <p:nvPicPr>
-          <p:cNvPr id="4" name="Picture 3"/>
-          <p:cNvPicPr>
-            <a:picLocks noChangeAspect="1"/>
-          </p:cNvPicPr>
-          <p:nvPr/>
-        </p:nvPicPr>
-        <p:blipFill>
-          <a:blip r:embed="rId2"/>
-          <a:stretch>
-            <a:fillRect/>
-          </a:stretch>
-        </p:blipFill>
-        <p:spPr>
-          <a:xfrm>
-            <a:off x="3405187" y="2805112"/>
-            <a:ext cx="2333625" cy="1247775"/>
-          </a:xfrm>
-          <a:prstGeom prst="rect">
-            <a:avLst/>
-          </a:prstGeom>
-        </p:spPr>
-      </p:pic>
-    </p:spTree>
-    <p:extLst>
-      <p:ext uri="{BB962C8B-B14F-4D97-AF65-F5344CB8AC3E}">
-        <p14:creationId xmlns:p14="http://schemas.microsoft.com/office/powerpoint/2010/main" val="876005449"/>
-      </p:ext>
-    </p:extLst>
-  </p:cSld>
-  <p:clrMapOvr>
-    <a:masterClrMapping/>
-  </p:clrMapOvr>
-</p:sld>
-</file>
-
-<file path=ppt/slides/slide13.xml><?xml version="1.0" encoding="utf-8"?>
-<p:sld xmlns:a="http://schemas.openxmlformats.org/drawingml/2006/main" xmlns:r="http://schemas.openxmlformats.org/officeDocument/2006/relationships" xmlns:p="http://schemas.openxmlformats.org/presentationml/2006/main">
-  <p:cSld>
-    <p:spTree>
-      <p:nvGrpSpPr>
-        <p:cNvPr id="1" name=""/>
-        <p:cNvGrpSpPr/>
-        <p:nvPr/>
-      </p:nvGrpSpPr>
-      <p:grpSpPr>
-        <a:xfrm>
-          <a:off x="0" y="0"/>
-          <a:ext cx="0" cy="0"/>
-          <a:chOff x="0" y="0"/>
-          <a:chExt cx="0" cy="0"/>
-        </a:xfrm>
-      </p:grpSpPr>
-      <p:sp>
-        <p:nvSpPr>
           <p:cNvPr id="4" name="Title 3"/>
           <p:cNvSpPr>
             <a:spLocks noGrp="1"/>
@@ -4290,7 +4194,7 @@
 </p:sld>
 </file>
 
-<file path=ppt/slides/slide14.xml><?xml version="1.0" encoding="utf-8"?>
+<file path=ppt/slides/slide13.xml><?xml version="1.0" encoding="utf-8"?>
 <p:sld xmlns:a="http://schemas.openxmlformats.org/drawingml/2006/main" xmlns:r="http://schemas.openxmlformats.org/officeDocument/2006/relationships" xmlns:p="http://schemas.openxmlformats.org/presentationml/2006/main">
   <p:cSld>
     <p:spTree>
@@ -4460,7 +4364,7 @@
 </p:sld>
 </file>
 
-<file path=ppt/slides/slide15.xml><?xml version="1.0" encoding="utf-8"?>
+<file path=ppt/slides/slide14.xml><?xml version="1.0" encoding="utf-8"?>
 <p:sld xmlns:a="http://schemas.openxmlformats.org/drawingml/2006/main" xmlns:r="http://schemas.openxmlformats.org/officeDocument/2006/relationships" xmlns:p="http://schemas.openxmlformats.org/presentationml/2006/main">
   <p:cSld>
     <p:spTree>
@@ -4623,7 +4527,7 @@
 </p:sld>
 </file>
 
-<file path=ppt/slides/slide16.xml><?xml version="1.0" encoding="utf-8"?>
+<file path=ppt/slides/slide15.xml><?xml version="1.0" encoding="utf-8"?>
 <p:sld xmlns:a="http://schemas.openxmlformats.org/drawingml/2006/main" xmlns:r="http://schemas.openxmlformats.org/officeDocument/2006/relationships" xmlns:p="http://schemas.openxmlformats.org/presentationml/2006/main">
   <p:cSld>
     <p:spTree>
@@ -4771,7 +4675,7 @@
 </p:sld>
 </file>
 
-<file path=ppt/slides/slide17.xml><?xml version="1.0" encoding="utf-8"?>
+<file path=ppt/slides/slide16.xml><?xml version="1.0" encoding="utf-8"?>
 <p:sld xmlns:a="http://schemas.openxmlformats.org/drawingml/2006/main" xmlns:r="http://schemas.openxmlformats.org/officeDocument/2006/relationships" xmlns:p="http://schemas.openxmlformats.org/presentationml/2006/main">
   <p:cSld>
     <p:spTree>
@@ -4964,7 +4868,7 @@
 </p:sld>
 </file>
 
-<file path=ppt/slides/slide18.xml><?xml version="1.0" encoding="utf-8"?>
+<file path=ppt/slides/slide17.xml><?xml version="1.0" encoding="utf-8"?>
 <p:sld xmlns:a="http://schemas.openxmlformats.org/drawingml/2006/main" xmlns:r="http://schemas.openxmlformats.org/officeDocument/2006/relationships" xmlns:p="http://schemas.openxmlformats.org/presentationml/2006/main">
   <p:cSld>
     <p:spTree>
@@ -5128,7 +5032,7 @@
 </p:sld>
 </file>
 
-<file path=ppt/slides/slide19.xml><?xml version="1.0" encoding="utf-8"?>
+<file path=ppt/slides/slide18.xml><?xml version="1.0" encoding="utf-8"?>
 <p:sld xmlns:a="http://schemas.openxmlformats.org/drawingml/2006/main" xmlns:r="http://schemas.openxmlformats.org/officeDocument/2006/relationships" xmlns:p="http://schemas.openxmlformats.org/presentationml/2006/main">
   <p:cSld>
     <p:spTree>
@@ -5434,78 +5338,7 @@
 </p:sld>
 </file>
 
-<file path=ppt/slides/slide2.xml><?xml version="1.0" encoding="utf-8"?>
-<p:sld xmlns:a="http://schemas.openxmlformats.org/drawingml/2006/main" xmlns:r="http://schemas.openxmlformats.org/officeDocument/2006/relationships" xmlns:p="http://schemas.openxmlformats.org/presentationml/2006/main">
-  <p:cSld>
-    <p:spTree>
-      <p:nvGrpSpPr>
-        <p:cNvPr id="1" name=""/>
-        <p:cNvGrpSpPr/>
-        <p:nvPr/>
-      </p:nvGrpSpPr>
-      <p:grpSpPr>
-        <a:xfrm>
-          <a:off x="0" y="0"/>
-          <a:ext cx="0" cy="0"/>
-          <a:chOff x="0" y="0"/>
-          <a:chExt cx="0" cy="0"/>
-        </a:xfrm>
-      </p:grpSpPr>
-      <p:sp>
-        <p:nvSpPr>
-          <p:cNvPr id="4" name="Title 3"/>
-          <p:cNvSpPr>
-            <a:spLocks noGrp="1"/>
-          </p:cNvSpPr>
-          <p:nvPr>
-            <p:ph type="ctrTitle"/>
-          </p:nvPr>
-        </p:nvSpPr>
-        <p:spPr/>
-        <p:txBody>
-          <a:bodyPr/>
-          <a:lstStyle/>
-          <a:p>
-            <a:r>
-              <a:rPr lang="en-US" dirty="0"/>
-              <a:t>Key Scenarios</a:t>
-            </a:r>
-          </a:p>
-        </p:txBody>
-      </p:sp>
-      <p:sp>
-        <p:nvSpPr>
-          <p:cNvPr id="5" name="Subtitle 4"/>
-          <p:cNvSpPr>
-            <a:spLocks noGrp="1"/>
-          </p:cNvSpPr>
-          <p:nvPr>
-            <p:ph type="subTitle" idx="1"/>
-          </p:nvPr>
-        </p:nvSpPr>
-        <p:spPr/>
-        <p:txBody>
-          <a:bodyPr/>
-          <a:lstStyle/>
-          <a:p>
-            <a:endParaRPr lang="en-US"/>
-          </a:p>
-        </p:txBody>
-      </p:sp>
-    </p:spTree>
-    <p:extLst>
-      <p:ext uri="{BB962C8B-B14F-4D97-AF65-F5344CB8AC3E}">
-        <p14:creationId xmlns:p14="http://schemas.microsoft.com/office/powerpoint/2010/main" val="2148533920"/>
-      </p:ext>
-    </p:extLst>
-  </p:cSld>
-  <p:clrMapOvr>
-    <a:masterClrMapping/>
-  </p:clrMapOvr>
-</p:sld>
-</file>
-
-<file path=ppt/slides/slide20.xml><?xml version="1.0" encoding="utf-8"?>
+<file path=ppt/slides/slide19.xml><?xml version="1.0" encoding="utf-8"?>
 <p:sld xmlns:a="http://schemas.openxmlformats.org/drawingml/2006/main" xmlns:r="http://schemas.openxmlformats.org/officeDocument/2006/relationships" xmlns:p="http://schemas.openxmlformats.org/presentationml/2006/main">
   <p:cSld>
     <p:spTree>
@@ -6107,7 +5940,7 @@
 </p:sld>
 </file>
 
-<file path=ppt/slides/slide21.xml><?xml version="1.0" encoding="utf-8"?>
+<file path=ppt/slides/slide2.xml><?xml version="1.0" encoding="utf-8"?>
 <p:sld xmlns:a="http://schemas.openxmlformats.org/drawingml/2006/main" xmlns:r="http://schemas.openxmlformats.org/officeDocument/2006/relationships" xmlns:p="http://schemas.openxmlformats.org/presentationml/2006/main">
   <p:cSld>
     <p:spTree>
@@ -6126,6 +5959,77 @@
       </p:grpSpPr>
       <p:sp>
         <p:nvSpPr>
+          <p:cNvPr id="4" name="Title 3"/>
+          <p:cNvSpPr>
+            <a:spLocks noGrp="1"/>
+          </p:cNvSpPr>
+          <p:nvPr>
+            <p:ph type="ctrTitle"/>
+          </p:nvPr>
+        </p:nvSpPr>
+        <p:spPr/>
+        <p:txBody>
+          <a:bodyPr/>
+          <a:lstStyle/>
+          <a:p>
+            <a:r>
+              <a:rPr lang="en-US" dirty="0"/>
+              <a:t>Key Scenarios</a:t>
+            </a:r>
+          </a:p>
+        </p:txBody>
+      </p:sp>
+      <p:sp>
+        <p:nvSpPr>
+          <p:cNvPr id="5" name="Subtitle 4"/>
+          <p:cNvSpPr>
+            <a:spLocks noGrp="1"/>
+          </p:cNvSpPr>
+          <p:nvPr>
+            <p:ph type="subTitle" idx="1"/>
+          </p:nvPr>
+        </p:nvSpPr>
+        <p:spPr/>
+        <p:txBody>
+          <a:bodyPr/>
+          <a:lstStyle/>
+          <a:p>
+            <a:endParaRPr lang="en-US"/>
+          </a:p>
+        </p:txBody>
+      </p:sp>
+    </p:spTree>
+    <p:extLst>
+      <p:ext uri="{BB962C8B-B14F-4D97-AF65-F5344CB8AC3E}">
+        <p14:creationId xmlns:p14="http://schemas.microsoft.com/office/powerpoint/2010/main" val="2148533920"/>
+      </p:ext>
+    </p:extLst>
+  </p:cSld>
+  <p:clrMapOvr>
+    <a:masterClrMapping/>
+  </p:clrMapOvr>
+</p:sld>
+</file>
+
+<file path=ppt/slides/slide20.xml><?xml version="1.0" encoding="utf-8"?>
+<p:sld xmlns:a="http://schemas.openxmlformats.org/drawingml/2006/main" xmlns:r="http://schemas.openxmlformats.org/officeDocument/2006/relationships" xmlns:p="http://schemas.openxmlformats.org/presentationml/2006/main">
+  <p:cSld>
+    <p:spTree>
+      <p:nvGrpSpPr>
+        <p:cNvPr id="1" name=""/>
+        <p:cNvGrpSpPr/>
+        <p:nvPr/>
+      </p:nvGrpSpPr>
+      <p:grpSpPr>
+        <a:xfrm>
+          <a:off x="0" y="0"/>
+          <a:ext cx="0" cy="0"/>
+          <a:chOff x="0" y="0"/>
+          <a:chExt cx="0" cy="0"/>
+        </a:xfrm>
+      </p:grpSpPr>
+      <p:sp>
+        <p:nvSpPr>
           <p:cNvPr id="2" name="Title 1">
             <a:extLst>
               <a:ext uri="{FF2B5EF4-FFF2-40B4-BE49-F238E27FC236}">
@@ -6234,7 +6138,7 @@
 </p:sld>
 </file>
 
-<file path=ppt/slides/slide22.xml><?xml version="1.0" encoding="utf-8"?>
+<file path=ppt/slides/slide21.xml><?xml version="1.0" encoding="utf-8"?>
 <p:sld xmlns:a="http://schemas.openxmlformats.org/drawingml/2006/main" xmlns:r="http://schemas.openxmlformats.org/officeDocument/2006/relationships" xmlns:p="http://schemas.openxmlformats.org/presentationml/2006/main">
   <p:cSld>
     <p:spTree>
@@ -6392,7 +6296,7 @@
 </p:sld>
 </file>
 
-<file path=ppt/slides/slide23.xml><?xml version="1.0" encoding="utf-8"?>
+<file path=ppt/slides/slide22.xml><?xml version="1.0" encoding="utf-8"?>
 <p:sld xmlns:a="http://schemas.openxmlformats.org/drawingml/2006/main" xmlns:r="http://schemas.openxmlformats.org/officeDocument/2006/relationships" xmlns:p="http://schemas.openxmlformats.org/presentationml/2006/main">
   <p:cSld>
     <p:spTree>
@@ -6500,7 +6404,7 @@
 </p:sld>
 </file>
 
-<file path=ppt/slides/slide24.xml><?xml version="1.0" encoding="utf-8"?>
+<file path=ppt/slides/slide23.xml><?xml version="1.0" encoding="utf-8"?>
 <p:sld xmlns:a="http://schemas.openxmlformats.org/drawingml/2006/main" xmlns:r="http://schemas.openxmlformats.org/officeDocument/2006/relationships" xmlns:p="http://schemas.openxmlformats.org/presentationml/2006/main">
   <p:cSld>
     <p:spTree>
@@ -7056,7 +6960,7 @@
 </p:sld>
 </file>
 
-<file path=ppt/slides/slide25.xml><?xml version="1.0" encoding="utf-8"?>
+<file path=ppt/slides/slide24.xml><?xml version="1.0" encoding="utf-8"?>
 <p:sld xmlns:a="http://schemas.openxmlformats.org/drawingml/2006/main" xmlns:r="http://schemas.openxmlformats.org/officeDocument/2006/relationships" xmlns:p="http://schemas.openxmlformats.org/presentationml/2006/main">
   <p:cSld>
     <p:spTree>
@@ -7234,7 +7138,7 @@
 </p:sld>
 </file>
 
-<file path=ppt/slides/slide26.xml><?xml version="1.0" encoding="utf-8"?>
+<file path=ppt/slides/slide25.xml><?xml version="1.0" encoding="utf-8"?>
 <p:sld xmlns:a="http://schemas.openxmlformats.org/drawingml/2006/main" xmlns:r="http://schemas.openxmlformats.org/officeDocument/2006/relationships" xmlns:p="http://schemas.openxmlformats.org/presentationml/2006/main">
   <p:cSld>
     <p:spTree>
@@ -8584,7 +8488,7 @@
 </p:sld>
 </file>
 
-<file path=ppt/slides/slide27.xml><?xml version="1.0" encoding="utf-8"?>
+<file path=ppt/slides/slide26.xml><?xml version="1.0" encoding="utf-8"?>
 <p:sld xmlns:a="http://schemas.openxmlformats.org/drawingml/2006/main" xmlns:r="http://schemas.openxmlformats.org/officeDocument/2006/relationships" xmlns:p="http://schemas.openxmlformats.org/presentationml/2006/main">
   <p:cSld>
     <p:spTree>
@@ -8717,6 +8621,115 @@
 </p:sld>
 </file>
 
+<file path=ppt/slides/slide27.xml><?xml version="1.0" encoding="utf-8"?>
+<p:sld xmlns:a="http://schemas.openxmlformats.org/drawingml/2006/main" xmlns:r="http://schemas.openxmlformats.org/officeDocument/2006/relationships" xmlns:p="http://schemas.openxmlformats.org/presentationml/2006/main">
+  <p:cSld>
+    <p:spTree>
+      <p:nvGrpSpPr>
+        <p:cNvPr id="1" name=""/>
+        <p:cNvGrpSpPr/>
+        <p:nvPr/>
+      </p:nvGrpSpPr>
+      <p:grpSpPr>
+        <a:xfrm>
+          <a:off x="0" y="0"/>
+          <a:ext cx="0" cy="0"/>
+          <a:chOff x="0" y="0"/>
+          <a:chExt cx="0" cy="0"/>
+        </a:xfrm>
+      </p:grpSpPr>
+      <p:sp>
+        <p:nvSpPr>
+          <p:cNvPr id="2" name="Title 1"/>
+          <p:cNvSpPr>
+            <a:spLocks noGrp="1"/>
+          </p:cNvSpPr>
+          <p:nvPr>
+            <p:ph type="title"/>
+          </p:nvPr>
+        </p:nvSpPr>
+        <p:spPr/>
+        <p:txBody>
+          <a:bodyPr/>
+          <a:lstStyle/>
+          <a:p>
+            <a:r>
+              <a:rPr lang="en-US" dirty="0"/>
+              <a:t>Property Guidelines</a:t>
+            </a:r>
+          </a:p>
+        </p:txBody>
+      </p:sp>
+      <p:sp>
+        <p:nvSpPr>
+          <p:cNvPr id="3" name="Content Placeholder 2"/>
+          <p:cNvSpPr>
+            <a:spLocks noGrp="1"/>
+          </p:cNvSpPr>
+          <p:nvPr>
+            <p:ph idx="1"/>
+          </p:nvPr>
+        </p:nvSpPr>
+        <p:spPr/>
+        <p:txBody>
+          <a:bodyPr>
+            <a:normAutofit fontScale="85000" lnSpcReduction="10000"/>
+          </a:bodyPr>
+          <a:lstStyle/>
+          <a:p>
+            <a:r>
+              <a:rPr lang="en-US" dirty="0"/>
+              <a:t>Keep properties as general purpose as possible.  </a:t>
+            </a:r>
+          </a:p>
+          <a:p>
+            <a:pPr lvl="1"/>
+            <a:r>
+              <a:rPr lang="en-US" dirty="0"/>
+              <a:t>E.g., “Charity Flight” rather than “Angel Flight”</a:t>
+            </a:r>
+          </a:p>
+          <a:p>
+            <a:r>
+              <a:rPr lang="en-US" dirty="0"/>
+              <a:t>Add properties only for things that really don’t belong in comments – i.e., for which a pilot might wat to do a structured search or a pivot table in Excel</a:t>
+            </a:r>
+          </a:p>
+          <a:p>
+            <a:r>
+              <a:rPr lang="en-US" dirty="0"/>
+              <a:t>Avoid properties that combine independent things</a:t>
+            </a:r>
+          </a:p>
+          <a:p>
+            <a:pPr lvl="1"/>
+            <a:r>
+              <a:rPr lang="en-US" dirty="0"/>
+              <a:t>E.g., stay away from “Night Cross-country” or “Solo Night Cross Country.”.  </a:t>
+            </a:r>
+          </a:p>
+          <a:p>
+            <a:pPr lvl="1"/>
+            <a:r>
+              <a:rPr lang="en-US" dirty="0"/>
+              <a:t>This is an invitation to ambiguity or errors in the data, don’t do it.</a:t>
+            </a:r>
+          </a:p>
+        </p:txBody>
+      </p:sp>
+    </p:spTree>
+    <p:extLst>
+      <p:ext uri="{BB962C8B-B14F-4D97-AF65-F5344CB8AC3E}">
+        <p14:creationId xmlns:p14="http://schemas.microsoft.com/office/powerpoint/2010/main" val="1893513869"/>
+      </p:ext>
+    </p:extLst>
+  </p:cSld>
+  <p:clrMapOvr>
+    <a:masterClrMapping/>
+  </p:clrMapOvr>
+</p:sld>
+</file>
+
 <file path=ppt/slides/slide28.xml><?xml version="1.0" encoding="utf-8"?>
 <p:sld xmlns:a="http://schemas.openxmlformats.org/drawingml/2006/main" xmlns:r="http://schemas.openxmlformats.org/officeDocument/2006/relationships" xmlns:p="http://schemas.openxmlformats.org/presentationml/2006/main">
   <p:cSld>
@@ -8746,12 +8759,14 @@
         </p:nvSpPr>
         <p:spPr/>
         <p:txBody>
-          <a:bodyPr/>
-          <a:lstStyle/>
-          <a:p>
-            <a:r>
-              <a:rPr lang="en-US" dirty="0"/>
-              <a:t>Property Guidelines</a:t>
+          <a:bodyPr>
+            <a:normAutofit fontScale="90000"/>
+          </a:bodyPr>
+          <a:lstStyle/>
+          <a:p>
+            <a:r>
+              <a:rPr lang="en-US" dirty="0"/>
+              <a:t>Admin Tools: Endorsement Templates</a:t>
             </a:r>
           </a:p>
         </p:txBody>
@@ -8769,46 +8784,54 @@
         <p:spPr/>
         <p:txBody>
           <a:bodyPr>
-            <a:normAutofit fontScale="85000" lnSpcReduction="10000"/>
+            <a:normAutofit fontScale="92500" lnSpcReduction="20000"/>
           </a:bodyPr>
           <a:lstStyle/>
           <a:p>
             <a:r>
               <a:rPr lang="en-US" dirty="0"/>
-              <a:t>Keep properties as general purpose as possible.  </a:t>
+              <a:t>This is where templates can be created/edited for endorsements that a flight instructor can give to a student</a:t>
+            </a:r>
+          </a:p>
+          <a:p>
+            <a:r>
+              <a:rPr lang="en-US" dirty="0"/>
+              <a:t>Uses a pseudo-markup language to specify placeholders for student name, date, etc.</a:t>
             </a:r>
           </a:p>
           <a:p>
             <a:pPr lvl="1"/>
             <a:r>
               <a:rPr lang="en-US" dirty="0"/>
-              <a:t>E.g., “Charity Flight” rather than “Angel Flight”</a:t>
-            </a:r>
-          </a:p>
-          <a:p>
-            <a:r>
-              <a:rPr lang="en-US" dirty="0"/>
-              <a:t>Add properties only for things that really don’t belong in comments – i.e., for which a pilot might wat to do a structured search or a pivot table in Excel</a:t>
-            </a:r>
-          </a:p>
-          <a:p>
-            <a:r>
-              <a:rPr lang="en-US" dirty="0"/>
-              <a:t>Avoid properties that combine independent things</a:t>
+              <a:t>{x} for a single-line entry with watermark "x"</a:t>
             </a:r>
           </a:p>
           <a:p>
             <a:pPr lvl="1"/>
             <a:r>
               <a:rPr lang="en-US" dirty="0"/>
-              <a:t>E.g., stay away from “Night Cross-country” or “Solo Night Cross Country.”.  </a:t>
+              <a:t>{Freeform} for freeform multi-line text (no watermark prompt)</a:t>
             </a:r>
           </a:p>
           <a:p>
             <a:pPr lvl="1"/>
             <a:r>
               <a:rPr lang="en-US" dirty="0"/>
-              <a:t>This is an invitation to ambiguity or errors in the data, don’t do it.</a:t>
+              <a:t>{Date} for the date (prefilled)</a:t>
+            </a:r>
+          </a:p>
+          <a:p>
+            <a:pPr lvl="1"/>
+            <a:r>
+              <a:rPr lang="en-US" dirty="0"/>
+              <a:t>{Student} for the Student's name (pre-filled)</a:t>
+            </a:r>
+          </a:p>
+          <a:p>
+            <a:pPr lvl="1"/>
+            <a:r>
+              <a:rPr lang="en-US" dirty="0"/>
+              <a:t>{x/y/z} for a drop-down of choices x, y, and z</a:t>
             </a:r>
           </a:p>
         </p:txBody>
@@ -8816,7 +8839,7 @@
     </p:spTree>
     <p:extLst>
       <p:ext uri="{BB962C8B-B14F-4D97-AF65-F5344CB8AC3E}">
-        <p14:creationId xmlns:p14="http://schemas.microsoft.com/office/powerpoint/2010/main" val="1893513869"/>
+        <p14:creationId xmlns:p14="http://schemas.microsoft.com/office/powerpoint/2010/main" val="1248576311"/>
       </p:ext>
     </p:extLst>
   </p:cSld>
@@ -8855,79 +8878,110 @@
         </p:nvSpPr>
         <p:spPr/>
         <p:txBody>
+          <a:bodyPr/>
+          <a:lstStyle/>
+          <a:p>
+            <a:r>
+              <a:rPr lang="en-US" dirty="0"/>
+              <a:t>Admin Tool: Edit FAQ</a:t>
+            </a:r>
+          </a:p>
+        </p:txBody>
+      </p:sp>
+      <p:sp>
+        <p:nvSpPr>
+          <p:cNvPr id="3" name="Content Placeholder 2"/>
+          <p:cNvSpPr>
+            <a:spLocks noGrp="1"/>
+          </p:cNvSpPr>
+          <p:nvPr>
+            <p:ph idx="1"/>
+          </p:nvPr>
+        </p:nvSpPr>
+        <p:spPr/>
+        <p:txBody>
           <a:bodyPr>
-            <a:normAutofit fontScale="90000"/>
+            <a:normAutofit fontScale="55000" lnSpcReduction="20000"/>
           </a:bodyPr>
           <a:lstStyle/>
           <a:p>
             <a:r>
               <a:rPr lang="en-US" dirty="0"/>
-              <a:t>Admin Tools: Endorsement Templates</a:t>
-            </a:r>
-          </a:p>
-        </p:txBody>
-      </p:sp>
-      <p:sp>
-        <p:nvSpPr>
-          <p:cNvPr id="3" name="Content Placeholder 2"/>
-          <p:cNvSpPr>
-            <a:spLocks noGrp="1"/>
-          </p:cNvSpPr>
-          <p:nvPr>
-            <p:ph idx="1"/>
-          </p:nvPr>
-        </p:nvSpPr>
-        <p:spPr/>
-        <p:txBody>
-          <a:bodyPr>
-            <a:normAutofit fontScale="92500" lnSpcReduction="20000"/>
-          </a:bodyPr>
-          <a:lstStyle/>
-          <a:p>
-            <a:r>
-              <a:rPr lang="en-US" dirty="0"/>
-              <a:t>This is where templates can be created/edited for endorsements that a flight instructor can give to a student</a:t>
-            </a:r>
-          </a:p>
-          <a:p>
-            <a:r>
-              <a:rPr lang="en-US" dirty="0"/>
-              <a:t>Uses a pseudo-markup language to specify placeholders for student name, date, etc.</a:t>
+              <a:t>Link to FAQ is on bottom of every page.</a:t>
+            </a:r>
+          </a:p>
+          <a:p>
+            <a:r>
+              <a:rPr lang="en-US" dirty="0"/>
+              <a:t>FAQ items consist of a category, a question, and an answer.  They are grouped by category at display time.</a:t>
+            </a:r>
+          </a:p>
+          <a:p>
+            <a:r>
+              <a:rPr lang="en-US" dirty="0"/>
+              <a:t>FAQ answer can contain HTML markup</a:t>
+            </a:r>
+          </a:p>
+          <a:p>
+            <a:r>
+              <a:rPr lang="en-US" dirty="0"/>
+              <a:t>FAQ is branding-aware (will use correct brand based on environment)</a:t>
             </a:r>
           </a:p>
           <a:p>
             <a:pPr lvl="1"/>
             <a:r>
               <a:rPr lang="en-US" dirty="0"/>
-              <a:t>{x} for a single-line entry with watermark "x"</a:t>
+              <a:t>All links should use relative paths (i.e., not include the domain name) to work with multiple brands</a:t>
             </a:r>
           </a:p>
           <a:p>
             <a:pPr lvl="1"/>
             <a:r>
               <a:rPr lang="en-US" dirty="0"/>
-              <a:t>{Freeform} for freeform multi-line text (no watermark prompt)</a:t>
+              <a:t>%APP_NAME%: the name of the app</a:t>
             </a:r>
           </a:p>
           <a:p>
             <a:pPr lvl="1"/>
             <a:r>
               <a:rPr lang="en-US" dirty="0"/>
-              <a:t>{Date} for the date (prefilled)</a:t>
+              <a:t>%SHORT_DATE%: Current date format (short) - date pattern</a:t>
             </a:r>
           </a:p>
           <a:p>
             <a:pPr lvl="1"/>
             <a:r>
               <a:rPr lang="en-US" dirty="0"/>
-              <a:t>{Student} for the Student's name (pre-filled)</a:t>
+              <a:t>%DATE_TIME%: Current time format (long) - sample in long format</a:t>
             </a:r>
           </a:p>
           <a:p>
             <a:pPr lvl="1"/>
             <a:r>
               <a:rPr lang="en-US" dirty="0"/>
-              <a:t>{x/y/z} for a drop-down of choices x, y, and z</a:t>
+              <a:t>%APP_URL%: the URL (host) for the current request.</a:t>
+            </a:r>
+          </a:p>
+          <a:p>
+            <a:pPr lvl="1"/>
+            <a:r>
+              <a:rPr lang="en-US" dirty="0"/>
+              <a:t>%APP_ROOT%: The root (analogous to "~") for the app brand.</a:t>
+            </a:r>
+          </a:p>
+          <a:p>
+            <a:pPr lvl="1"/>
+            <a:r>
+              <a:rPr lang="en-US" dirty="0"/>
+              <a:t>%APP_LOGO%: the URL for the app logo</a:t>
+            </a:r>
+          </a:p>
+          <a:p>
+            <a:pPr lvl="1"/>
+            <a:r>
+              <a:rPr lang="en-US" dirty="0"/>
+              <a:t>E.g., the “Contact” link is http://%APP_URL%%APP_ROOT%/Public/ContactMe.aspx which translates to http://myflightbook.com/logbook/Public/ContactMe.aspx</a:t>
             </a:r>
           </a:p>
         </p:txBody>
@@ -8935,7 +8989,7 @@
     </p:spTree>
     <p:extLst>
       <p:ext uri="{BB962C8B-B14F-4D97-AF65-F5344CB8AC3E}">
-        <p14:creationId xmlns:p14="http://schemas.microsoft.com/office/powerpoint/2010/main" val="1248576311"/>
+        <p14:creationId xmlns:p14="http://schemas.microsoft.com/office/powerpoint/2010/main" val="680066526"/>
       </p:ext>
     </p:extLst>
   </p:cSld>
@@ -9038,156 +9092,6 @@
 </file>
 
 <file path=ppt/slides/slide30.xml><?xml version="1.0" encoding="utf-8"?>
-<p:sld xmlns:a="http://schemas.openxmlformats.org/drawingml/2006/main" xmlns:r="http://schemas.openxmlformats.org/officeDocument/2006/relationships" xmlns:p="http://schemas.openxmlformats.org/presentationml/2006/main">
-  <p:cSld>
-    <p:spTree>
-      <p:nvGrpSpPr>
-        <p:cNvPr id="1" name=""/>
-        <p:cNvGrpSpPr/>
-        <p:nvPr/>
-      </p:nvGrpSpPr>
-      <p:grpSpPr>
-        <a:xfrm>
-          <a:off x="0" y="0"/>
-          <a:ext cx="0" cy="0"/>
-          <a:chOff x="0" y="0"/>
-          <a:chExt cx="0" cy="0"/>
-        </a:xfrm>
-      </p:grpSpPr>
-      <p:sp>
-        <p:nvSpPr>
-          <p:cNvPr id="2" name="Title 1"/>
-          <p:cNvSpPr>
-            <a:spLocks noGrp="1"/>
-          </p:cNvSpPr>
-          <p:nvPr>
-            <p:ph type="title"/>
-          </p:nvPr>
-        </p:nvSpPr>
-        <p:spPr/>
-        <p:txBody>
-          <a:bodyPr/>
-          <a:lstStyle/>
-          <a:p>
-            <a:r>
-              <a:rPr lang="en-US" dirty="0"/>
-              <a:t>Admin Tool: Edit FAQ</a:t>
-            </a:r>
-          </a:p>
-        </p:txBody>
-      </p:sp>
-      <p:sp>
-        <p:nvSpPr>
-          <p:cNvPr id="3" name="Content Placeholder 2"/>
-          <p:cNvSpPr>
-            <a:spLocks noGrp="1"/>
-          </p:cNvSpPr>
-          <p:nvPr>
-            <p:ph idx="1"/>
-          </p:nvPr>
-        </p:nvSpPr>
-        <p:spPr/>
-        <p:txBody>
-          <a:bodyPr>
-            <a:normAutofit fontScale="55000" lnSpcReduction="20000"/>
-          </a:bodyPr>
-          <a:lstStyle/>
-          <a:p>
-            <a:r>
-              <a:rPr lang="en-US" dirty="0"/>
-              <a:t>Link to FAQ is on bottom of every page.</a:t>
-            </a:r>
-          </a:p>
-          <a:p>
-            <a:r>
-              <a:rPr lang="en-US" dirty="0"/>
-              <a:t>FAQ items consist of a category, a question, and an answer.  They are grouped by category at display time.</a:t>
-            </a:r>
-          </a:p>
-          <a:p>
-            <a:r>
-              <a:rPr lang="en-US" dirty="0"/>
-              <a:t>FAQ answer can contain HTML markup</a:t>
-            </a:r>
-          </a:p>
-          <a:p>
-            <a:r>
-              <a:rPr lang="en-US" dirty="0"/>
-              <a:t>FAQ is branding-aware (will use correct brand based on environment)</a:t>
-            </a:r>
-          </a:p>
-          <a:p>
-            <a:pPr lvl="1"/>
-            <a:r>
-              <a:rPr lang="en-US" dirty="0"/>
-              <a:t>All links should use relative paths (i.e., not include the domain name) to work with multiple brands</a:t>
-            </a:r>
-          </a:p>
-          <a:p>
-            <a:pPr lvl="1"/>
-            <a:r>
-              <a:rPr lang="en-US" dirty="0"/>
-              <a:t>%APP_NAME%: the name of the app</a:t>
-            </a:r>
-          </a:p>
-          <a:p>
-            <a:pPr lvl="1"/>
-            <a:r>
-              <a:rPr lang="en-US" dirty="0"/>
-              <a:t>%SHORT_DATE%: Current date format (short) - date pattern</a:t>
-            </a:r>
-          </a:p>
-          <a:p>
-            <a:pPr lvl="1"/>
-            <a:r>
-              <a:rPr lang="en-US" dirty="0"/>
-              <a:t>%DATE_TIME%: Current time format (long) - sample in long format</a:t>
-            </a:r>
-          </a:p>
-          <a:p>
-            <a:pPr lvl="1"/>
-            <a:r>
-              <a:rPr lang="en-US" dirty="0"/>
-              <a:t>%APP_URL%: the URL (host) for the current request.</a:t>
-            </a:r>
-          </a:p>
-          <a:p>
-            <a:pPr lvl="1"/>
-            <a:r>
-              <a:rPr lang="en-US" dirty="0"/>
-              <a:t>%APP_ROOT%: The root (analogous to "~") for the app brand.</a:t>
-            </a:r>
-          </a:p>
-          <a:p>
-            <a:pPr lvl="1"/>
-            <a:r>
-              <a:rPr lang="en-US" dirty="0"/>
-              <a:t>%APP_LOGO%: the URL for the app logo</a:t>
-            </a:r>
-          </a:p>
-          <a:p>
-            <a:pPr lvl="1"/>
-            <a:r>
-              <a:rPr lang="en-US" dirty="0"/>
-              <a:t>E.g., the “Contact” link is http://%APP_URL%%APP_ROOT%/Public/ContactMe.aspx which translates to http://myflightbook.com/logbook/Public/ContactMe.aspx</a:t>
-            </a:r>
-          </a:p>
-        </p:txBody>
-      </p:sp>
-    </p:spTree>
-    <p:extLst>
-      <p:ext uri="{BB962C8B-B14F-4D97-AF65-F5344CB8AC3E}">
-        <p14:creationId xmlns:p14="http://schemas.microsoft.com/office/powerpoint/2010/main" val="680066526"/>
-      </p:ext>
-    </p:extLst>
-  </p:cSld>
-  <p:clrMapOvr>
-    <a:masterClrMapping/>
-  </p:clrMapOvr>
-</p:sld>
-</file>
-
-<file path=ppt/slides/slide31.xml><?xml version="1.0" encoding="utf-8"?>
 <p:sld xmlns:a="http://schemas.openxmlformats.org/drawingml/2006/main" xmlns:r="http://schemas.openxmlformats.org/officeDocument/2006/relationships" xmlns:p="http://schemas.openxmlformats.org/presentationml/2006/main">
   <p:cSld>
     <p:spTree>
@@ -9347,6 +9251,86 @@
 </p:sld>
 </file>
 
+<file path=ppt/slides/slide31.xml><?xml version="1.0" encoding="utf-8"?>
+<p:sld xmlns:a="http://schemas.openxmlformats.org/drawingml/2006/main" xmlns:r="http://schemas.openxmlformats.org/officeDocument/2006/relationships" xmlns:p="http://schemas.openxmlformats.org/presentationml/2006/main">
+  <p:cSld>
+    <p:spTree>
+      <p:nvGrpSpPr>
+        <p:cNvPr id="1" name=""/>
+        <p:cNvGrpSpPr/>
+        <p:nvPr/>
+      </p:nvGrpSpPr>
+      <p:grpSpPr>
+        <a:xfrm>
+          <a:off x="0" y="0"/>
+          <a:ext cx="0" cy="0"/>
+          <a:chOff x="0" y="0"/>
+          <a:chExt cx="0" cy="0"/>
+        </a:xfrm>
+      </p:grpSpPr>
+      <p:sp>
+        <p:nvSpPr>
+          <p:cNvPr id="2" name="Title 1"/>
+          <p:cNvSpPr>
+            <a:spLocks noGrp="1"/>
+          </p:cNvSpPr>
+          <p:nvPr>
+            <p:ph type="title"/>
+          </p:nvPr>
+        </p:nvSpPr>
+        <p:spPr/>
+        <p:txBody>
+          <a:bodyPr/>
+          <a:lstStyle/>
+          <a:p>
+            <a:r>
+              <a:rPr lang="en-US" dirty="0"/>
+              <a:t>Admin Tools: Telemetry</a:t>
+            </a:r>
+          </a:p>
+        </p:txBody>
+      </p:sp>
+      <p:sp>
+        <p:nvSpPr>
+          <p:cNvPr id="3" name="Content Placeholder 2"/>
+          <p:cNvSpPr>
+            <a:spLocks noGrp="1"/>
+          </p:cNvSpPr>
+          <p:nvPr>
+            <p:ph idx="1"/>
+          </p:nvPr>
+        </p:nvSpPr>
+        <p:spPr/>
+        <p:txBody>
+          <a:bodyPr/>
+          <a:lstStyle/>
+          <a:p>
+            <a:r>
+              <a:rPr lang="en-US" dirty="0"/>
+              <a:t>Allows migration of telemetry between database and individual disk files (similar to images and Amazon S3)</a:t>
+            </a:r>
+          </a:p>
+          <a:p>
+            <a:r>
+              <a:rPr lang="en-US" dirty="0"/>
+              <a:t>Can also reconcile data inconsistencies, and look up telemetry on a per-user basis and see stats.</a:t>
+            </a:r>
+          </a:p>
+        </p:txBody>
+      </p:sp>
+    </p:spTree>
+    <p:extLst>
+      <p:ext uri="{BB962C8B-B14F-4D97-AF65-F5344CB8AC3E}">
+        <p14:creationId xmlns:p14="http://schemas.microsoft.com/office/powerpoint/2010/main" val="3440863894"/>
+      </p:ext>
+    </p:extLst>
+  </p:cSld>
+  <p:clrMapOvr>
+    <a:masterClrMapping/>
+  </p:clrMapOvr>
+</p:sld>
+</file>
+
 <file path=ppt/slides/slide32.xml><?xml version="1.0" encoding="utf-8"?>
 <p:sld xmlns:a="http://schemas.openxmlformats.org/drawingml/2006/main" xmlns:r="http://schemas.openxmlformats.org/officeDocument/2006/relationships" xmlns:p="http://schemas.openxmlformats.org/presentationml/2006/main">
   <p:cSld>
@@ -9381,8 +9365,13 @@
           <a:p>
             <a:r>
               <a:rPr lang="en-US" dirty="0"/>
-              <a:t>Admin Tools: Telemetry</a:t>
-            </a:r>
+              <a:t>Admin Tools: </a:t>
+            </a:r>
+            <a:r>
+              <a:rPr lang="en-US" dirty="0" err="1"/>
+              <a:t>Misc</a:t>
+            </a:r>
+            <a:endParaRPr lang="en-US" dirty="0"/>
           </a:p>
         </p:txBody>
       </p:sp>
@@ -9398,18 +9387,62 @@
         </p:nvSpPr>
         <p:spPr/>
         <p:txBody>
-          <a:bodyPr/>
-          <a:lstStyle/>
-          <a:p>
-            <a:r>
-              <a:rPr lang="en-US" dirty="0"/>
-              <a:t>Allows migration of telemetry between database and individual disk files (similar to images and Amazon S3)</a:t>
-            </a:r>
-          </a:p>
-          <a:p>
-            <a:r>
-              <a:rPr lang="en-US" dirty="0"/>
-              <a:t>Can also reconcile data inconsistencies, and look up telemetry on a per-user basis and see stats.</a:t>
+          <a:bodyPr>
+            <a:normAutofit fontScale="85000" lnSpcReduction="10000"/>
+          </a:bodyPr>
+          <a:lstStyle/>
+          <a:p>
+            <a:r>
+              <a:rPr lang="en-US" dirty="0"/>
+              <a:t>Handle duplicate/empty properties</a:t>
+            </a:r>
+          </a:p>
+          <a:p>
+            <a:pPr lvl="1"/>
+            <a:r>
+              <a:rPr lang="en-US" dirty="0"/>
+              <a:t>Just click them to view them in context and delete them (obviously only one in the case of duplicates).</a:t>
+            </a:r>
+          </a:p>
+          <a:p>
+            <a:pPr lvl="1"/>
+            <a:r>
+              <a:rPr lang="en-US" dirty="0"/>
+              <a:t>I think I’ve finally caught all the scenarios where this can happen; haven’t seen dupes in a while</a:t>
+            </a:r>
+          </a:p>
+          <a:p>
+            <a:r>
+              <a:rPr lang="en-US" dirty="0"/>
+              <a:t>Investigate/</a:t>
+            </a:r>
+            <a:r>
+              <a:rPr lang="en-US" dirty="0" err="1"/>
+              <a:t>recompute</a:t>
+            </a:r>
+            <a:r>
+              <a:rPr lang="en-US" dirty="0"/>
+              <a:t> invalid signatures (slow!)</a:t>
+            </a:r>
+          </a:p>
+          <a:p>
+            <a:pPr lvl="1"/>
+            <a:r>
+              <a:rPr lang="en-US" dirty="0"/>
+              <a:t>Can arise if aircraft changes (e.g., clone or merging of duplicate aircraft)</a:t>
+            </a:r>
+          </a:p>
+          <a:p>
+            <a:pPr lvl="1"/>
+            <a:r>
+              <a:rPr lang="en-US" dirty="0"/>
+              <a:t>Best to do this on a development machine first.</a:t>
+            </a:r>
+          </a:p>
+          <a:p>
+            <a:r>
+              <a:rPr lang="en-US" dirty="0"/>
+              <a:t>Flush the cache on the live site (to pick up DB changes)</a:t>
             </a:r>
           </a:p>
         </p:txBody>
@@ -9417,7 +9450,7 @@
     </p:spTree>
     <p:extLst>
       <p:ext uri="{BB962C8B-B14F-4D97-AF65-F5344CB8AC3E}">
-        <p14:creationId xmlns:p14="http://schemas.microsoft.com/office/powerpoint/2010/main" val="3440863894"/>
+        <p14:creationId xmlns:p14="http://schemas.microsoft.com/office/powerpoint/2010/main" val="2007248668"/>
       </p:ext>
     </p:extLst>
   </p:cSld>
@@ -9446,12 +9479,12 @@
       </p:grpSpPr>
       <p:sp>
         <p:nvSpPr>
-          <p:cNvPr id="2" name="Title 1"/>
-          <p:cNvSpPr>
-            <a:spLocks noGrp="1"/>
-          </p:cNvSpPr>
-          <p:nvPr>
-            <p:ph type="title"/>
+          <p:cNvPr id="4" name="Title 3"/>
+          <p:cNvSpPr>
+            <a:spLocks noGrp="1"/>
+          </p:cNvSpPr>
+          <p:nvPr>
+            <p:ph type="ctrTitle"/>
           </p:nvPr>
         </p:nvSpPr>
         <p:spPr/>
@@ -9461,92 +9494,34 @@
           <a:p>
             <a:r>
               <a:rPr lang="en-US" dirty="0"/>
-              <a:t>Admin Tools: </a:t>
-            </a:r>
-            <a:r>
-              <a:rPr lang="en-US" dirty="0" err="1"/>
-              <a:t>Misc</a:t>
-            </a:r>
-            <a:endParaRPr lang="en-US" dirty="0"/>
-          </a:p>
-        </p:txBody>
-      </p:sp>
-      <p:sp>
-        <p:nvSpPr>
-          <p:cNvPr id="3" name="Content Placeholder 2"/>
-          <p:cNvSpPr>
-            <a:spLocks noGrp="1"/>
-          </p:cNvSpPr>
-          <p:nvPr>
-            <p:ph idx="1"/>
+              <a:t>Reporting</a:t>
+            </a:r>
+          </a:p>
+        </p:txBody>
+      </p:sp>
+      <p:sp>
+        <p:nvSpPr>
+          <p:cNvPr id="5" name="Subtitle 4"/>
+          <p:cNvSpPr>
+            <a:spLocks noGrp="1"/>
+          </p:cNvSpPr>
+          <p:nvPr>
+            <p:ph type="subTitle" idx="1"/>
           </p:nvPr>
         </p:nvSpPr>
         <p:spPr/>
         <p:txBody>
-          <a:bodyPr>
-            <a:normAutofit fontScale="85000" lnSpcReduction="10000"/>
-          </a:bodyPr>
-          <a:lstStyle/>
-          <a:p>
-            <a:r>
-              <a:rPr lang="en-US" dirty="0"/>
-              <a:t>Handle duplicate/empty properties</a:t>
-            </a:r>
-          </a:p>
-          <a:p>
-            <a:pPr lvl="1"/>
-            <a:r>
-              <a:rPr lang="en-US" dirty="0"/>
-              <a:t>Just click them to view them in context and delete them (obviously only one in the case of duplicates).</a:t>
-            </a:r>
-          </a:p>
-          <a:p>
-            <a:pPr lvl="1"/>
-            <a:r>
-              <a:rPr lang="en-US" dirty="0"/>
-              <a:t>I think I’ve finally caught all the scenarios where this can happen; haven’t seen dupes in a while</a:t>
-            </a:r>
-          </a:p>
-          <a:p>
-            <a:r>
-              <a:rPr lang="en-US" dirty="0"/>
-              <a:t>Investigate/</a:t>
-            </a:r>
-            <a:r>
-              <a:rPr lang="en-US" dirty="0" err="1"/>
-              <a:t>recompute</a:t>
-            </a:r>
-            <a:r>
-              <a:rPr lang="en-US" dirty="0"/>
-              <a:t> invalid signatures (slow!)</a:t>
-            </a:r>
-          </a:p>
-          <a:p>
-            <a:pPr lvl="1"/>
-            <a:r>
-              <a:rPr lang="en-US" dirty="0"/>
-              <a:t>Can arise if aircraft changes (e.g., clone or merging of duplicate aircraft)</a:t>
-            </a:r>
-          </a:p>
-          <a:p>
-            <a:pPr lvl="1"/>
-            <a:r>
-              <a:rPr lang="en-US" dirty="0"/>
-              <a:t>Best to do this on a development machine first.</a:t>
-            </a:r>
-          </a:p>
-          <a:p>
-            <a:r>
-              <a:rPr lang="en-US" dirty="0"/>
-              <a:t>Flush the cache on the live site (to pick up DB changes)</a:t>
-            </a:r>
+          <a:bodyPr/>
+          <a:lstStyle/>
+          <a:p>
+            <a:endParaRPr lang="en-US"/>
           </a:p>
         </p:txBody>
       </p:sp>
     </p:spTree>
     <p:extLst>
       <p:ext uri="{BB962C8B-B14F-4D97-AF65-F5344CB8AC3E}">
-        <p14:creationId xmlns:p14="http://schemas.microsoft.com/office/powerpoint/2010/main" val="2007248668"/>
+        <p14:creationId xmlns:p14="http://schemas.microsoft.com/office/powerpoint/2010/main" val="3700926872"/>
       </p:ext>
     </p:extLst>
   </p:cSld>
@@ -9575,12 +9550,12 @@
       </p:grpSpPr>
       <p:sp>
         <p:nvSpPr>
-          <p:cNvPr id="4" name="Title 3"/>
-          <p:cNvSpPr>
-            <a:spLocks noGrp="1"/>
-          </p:cNvSpPr>
-          <p:nvPr>
-            <p:ph type="ctrTitle"/>
+          <p:cNvPr id="2" name="Title 1"/>
+          <p:cNvSpPr>
+            <a:spLocks noGrp="1"/>
+          </p:cNvSpPr>
+          <p:nvPr>
+            <p:ph type="title"/>
           </p:nvPr>
         </p:nvSpPr>
         <p:spPr/>
@@ -9590,19 +9565,19 @@
           <a:p>
             <a:r>
               <a:rPr lang="en-US" dirty="0"/>
-              <a:t>Reporting</a:t>
-            </a:r>
-          </a:p>
-        </p:txBody>
-      </p:sp>
-      <p:sp>
-        <p:nvSpPr>
-          <p:cNvPr id="5" name="Subtitle 4"/>
-          <p:cNvSpPr>
-            <a:spLocks noGrp="1"/>
-          </p:cNvSpPr>
-          <p:nvPr>
-            <p:ph type="subTitle" idx="1"/>
+              <a:t>Donations</a:t>
+            </a:r>
+          </a:p>
+        </p:txBody>
+      </p:sp>
+      <p:sp>
+        <p:nvSpPr>
+          <p:cNvPr id="3" name="Content Placeholder 2"/>
+          <p:cNvSpPr>
+            <a:spLocks noGrp="1"/>
+          </p:cNvSpPr>
+          <p:nvPr>
+            <p:ph idx="1"/>
           </p:nvPr>
         </p:nvSpPr>
         <p:spPr/>
@@ -9610,14 +9585,36 @@
           <a:bodyPr/>
           <a:lstStyle/>
           <a:p>
-            <a:endParaRPr lang="en-US"/>
+            <a:r>
+              <a:rPr lang="en-US" dirty="0"/>
+              <a:t>View details of donations made by time period</a:t>
+            </a:r>
+          </a:p>
+          <a:p>
+            <a:r>
+              <a:rPr lang="en-US" dirty="0"/>
+              <a:t>Search for donations by username</a:t>
+            </a:r>
+          </a:p>
+          <a:p>
+            <a:r>
+              <a:rPr lang="en-US" dirty="0"/>
+              <a:t>Add transactions manually to make adjustments </a:t>
+            </a:r>
+          </a:p>
+          <a:p>
+            <a:pPr lvl="1"/>
+            <a:r>
+              <a:rPr lang="en-US" dirty="0"/>
+              <a:t>Does NOT issue refunds!!  This is just local recordkeeping</a:t>
+            </a:r>
           </a:p>
         </p:txBody>
       </p:sp>
     </p:spTree>
     <p:extLst>
       <p:ext uri="{BB962C8B-B14F-4D97-AF65-F5344CB8AC3E}">
-        <p14:creationId xmlns:p14="http://schemas.microsoft.com/office/powerpoint/2010/main" val="3700926872"/>
+        <p14:creationId xmlns:p14="http://schemas.microsoft.com/office/powerpoint/2010/main" val="762305122"/>
       </p:ext>
     </p:extLst>
   </p:cSld>
@@ -9661,7 +9658,7 @@
           <a:p>
             <a:r>
               <a:rPr lang="en-US" dirty="0"/>
-              <a:t>Donations</a:t>
+              <a:t>Admin Tools: Stats</a:t>
             </a:r>
           </a:p>
         </p:txBody>
@@ -9683,34 +9680,36 @@
           <a:p>
             <a:r>
               <a:rPr lang="en-US" dirty="0"/>
-              <a:t>View details of donations made by time period</a:t>
-            </a:r>
-          </a:p>
-          <a:p>
-            <a:r>
-              <a:rPr lang="en-US" dirty="0"/>
-              <a:t>Search for donations by username</a:t>
-            </a:r>
-          </a:p>
-          <a:p>
-            <a:r>
-              <a:rPr lang="en-US" dirty="0"/>
-              <a:t>Add transactions manually to make adjustments </a:t>
-            </a:r>
-          </a:p>
-          <a:p>
-            <a:pPr lvl="1"/>
-            <a:r>
-              <a:rPr lang="en-US" dirty="0"/>
-              <a:t>Does NOT issue refunds!!  This is just local recordkeeping</a:t>
-            </a:r>
+              <a:t>Displays some interesting usage statistics for the site.</a:t>
+            </a:r>
+          </a:p>
+          <a:p>
+            <a:r>
+              <a:rPr lang="en-US" dirty="0"/>
+              <a:t>No actions necessary in this section</a:t>
+            </a:r>
+          </a:p>
+          <a:p>
+            <a:r>
+              <a:rPr lang="en-US" dirty="0"/>
+              <a:t>Emailed nightly</a:t>
+            </a:r>
+          </a:p>
+          <a:p>
+            <a:r>
+              <a:rPr lang="en-US" dirty="0"/>
+              <a:t>SLOW to compute</a:t>
+            </a:r>
+          </a:p>
+          <a:p>
+            <a:endParaRPr lang="en-US" dirty="0"/>
           </a:p>
         </p:txBody>
       </p:sp>
     </p:spTree>
     <p:extLst>
       <p:ext uri="{BB962C8B-B14F-4D97-AF65-F5344CB8AC3E}">
-        <p14:creationId xmlns:p14="http://schemas.microsoft.com/office/powerpoint/2010/main" val="762305122"/>
+        <p14:creationId xmlns:p14="http://schemas.microsoft.com/office/powerpoint/2010/main" val="2703966438"/>
       </p:ext>
     </p:extLst>
   </p:cSld>
@@ -9744,7 +9743,7 @@
             <a:spLocks noGrp="1"/>
           </p:cNvSpPr>
           <p:nvPr>
-            <p:ph type="title"/>
+            <p:ph type="ctrTitle"/>
           </p:nvPr>
         </p:nvSpPr>
         <p:spPr/>
@@ -9753,20 +9752,21 @@
           <a:lstStyle/>
           <a:p>
             <a:r>
-              <a:rPr lang="en-US" dirty="0"/>
-              <a:t>Admin Tools: Stats</a:t>
-            </a:r>
-          </a:p>
-        </p:txBody>
-      </p:sp>
-      <p:sp>
-        <p:nvSpPr>
-          <p:cNvPr id="3" name="Content Placeholder 2"/>
-          <p:cNvSpPr>
-            <a:spLocks noGrp="1"/>
-          </p:cNvSpPr>
-          <p:nvPr>
-            <p:ph idx="1"/>
+              <a:rPr lang="en-US" dirty="0" err="1"/>
+              <a:t>Misc</a:t>
+            </a:r>
+            <a:endParaRPr lang="en-US" dirty="0"/>
+          </a:p>
+        </p:txBody>
+      </p:sp>
+      <p:sp>
+        <p:nvSpPr>
+          <p:cNvPr id="3" name="Subtitle 2"/>
+          <p:cNvSpPr>
+            <a:spLocks noGrp="1"/>
+          </p:cNvSpPr>
+          <p:nvPr>
+            <p:ph type="subTitle" idx="1"/>
           </p:nvPr>
         </p:nvSpPr>
         <p:spPr/>
@@ -9774,38 +9774,14 @@
           <a:bodyPr/>
           <a:lstStyle/>
           <a:p>
-            <a:r>
-              <a:rPr lang="en-US" dirty="0"/>
-              <a:t>Displays some interesting usage statistics for the site.</a:t>
-            </a:r>
-          </a:p>
-          <a:p>
-            <a:r>
-              <a:rPr lang="en-US" dirty="0"/>
-              <a:t>No actions necessary in this section</a:t>
-            </a:r>
-          </a:p>
-          <a:p>
-            <a:r>
-              <a:rPr lang="en-US" dirty="0"/>
-              <a:t>Emailed nightly</a:t>
-            </a:r>
-          </a:p>
-          <a:p>
-            <a:r>
-              <a:rPr lang="en-US" dirty="0"/>
-              <a:t>SLOW to compute</a:t>
-            </a:r>
-          </a:p>
-          <a:p>
-            <a:endParaRPr lang="en-US" dirty="0"/>
+            <a:endParaRPr lang="en-US"/>
           </a:p>
         </p:txBody>
       </p:sp>
     </p:spTree>
     <p:extLst>
       <p:ext uri="{BB962C8B-B14F-4D97-AF65-F5344CB8AC3E}">
-        <p14:creationId xmlns:p14="http://schemas.microsoft.com/office/powerpoint/2010/main" val="2703966438"/>
+        <p14:creationId xmlns:p14="http://schemas.microsoft.com/office/powerpoint/2010/main" val="73007954"/>
       </p:ext>
     </p:extLst>
   </p:cSld>
@@ -9839,7 +9815,7 @@
             <a:spLocks noGrp="1"/>
           </p:cNvSpPr>
           <p:nvPr>
-            <p:ph type="ctrTitle"/>
+            <p:ph type="title"/>
           </p:nvPr>
         </p:nvSpPr>
         <p:spPr/>
@@ -9848,36 +9824,58 @@
           <a:lstStyle/>
           <a:p>
             <a:r>
+              <a:rPr lang="en-US" dirty="0"/>
+              <a:t>Shunting the site</a:t>
+            </a:r>
+          </a:p>
+        </p:txBody>
+      </p:sp>
+      <p:sp>
+        <p:nvSpPr>
+          <p:cNvPr id="3" name="Content Placeholder 2"/>
+          <p:cNvSpPr>
+            <a:spLocks noGrp="1"/>
+          </p:cNvSpPr>
+          <p:nvPr>
+            <p:ph idx="1"/>
+          </p:nvPr>
+        </p:nvSpPr>
+        <p:spPr/>
+        <p:txBody>
+          <a:bodyPr/>
+          <a:lstStyle/>
+          <a:p>
+            <a:r>
+              <a:rPr lang="en-US" dirty="0"/>
+              <a:t>LAST RESORT – CALL ME</a:t>
+            </a:r>
+          </a:p>
+          <a:p>
+            <a:r>
+              <a:rPr lang="en-US" dirty="0"/>
+              <a:t>Site can be shunted if necessary</a:t>
+            </a:r>
+          </a:p>
+          <a:p>
+            <a:r>
+              <a:rPr lang="en-US" dirty="0"/>
+              <a:t>Requires editing </a:t>
+            </a:r>
+            <a:r>
               <a:rPr lang="en-US" dirty="0" err="1"/>
-              <a:t>Misc</a:t>
-            </a:r>
-            <a:endParaRPr lang="en-US" dirty="0"/>
-          </a:p>
-        </p:txBody>
-      </p:sp>
-      <p:sp>
-        <p:nvSpPr>
-          <p:cNvPr id="3" name="Subtitle 2"/>
-          <p:cNvSpPr>
-            <a:spLocks noGrp="1"/>
-          </p:cNvSpPr>
-          <p:nvPr>
-            <p:ph type="subTitle" idx="1"/>
-          </p:nvPr>
-        </p:nvSpPr>
-        <p:spPr/>
-        <p:txBody>
-          <a:bodyPr/>
-          <a:lstStyle/>
-          <a:p>
-            <a:endParaRPr lang="en-US"/>
+              <a:t>Web.config</a:t>
+            </a:r>
+            <a:r>
+              <a:rPr lang="en-US" dirty="0"/>
+              <a:t> on live site.  Search for word “Shunt” and you’ll see what to do.  Save the change.  Undo it to un-shunt</a:t>
+            </a:r>
           </a:p>
         </p:txBody>
       </p:sp>
     </p:spTree>
     <p:extLst>
       <p:ext uri="{BB962C8B-B14F-4D97-AF65-F5344CB8AC3E}">
-        <p14:creationId xmlns:p14="http://schemas.microsoft.com/office/powerpoint/2010/main" val="73007954"/>
+        <p14:creationId xmlns:p14="http://schemas.microsoft.com/office/powerpoint/2010/main" val="3705413828"/>
       </p:ext>
     </p:extLst>
   </p:cSld>
@@ -9921,7 +9919,7 @@
           <a:p>
             <a:r>
               <a:rPr lang="en-US" dirty="0"/>
-              <a:t>Shunting the site</a:t>
+              <a:t>My Contact Information</a:t>
             </a:r>
           </a:p>
         </p:txBody>
@@ -9943,27 +9941,43 @@
           <a:p>
             <a:r>
               <a:rPr lang="en-US" dirty="0"/>
-              <a:t>LAST RESORT – CALL ME</a:t>
-            </a:r>
-          </a:p>
-          <a:p>
-            <a:r>
-              <a:rPr lang="en-US" dirty="0"/>
-              <a:t>Site can be shunted if necessary</a:t>
-            </a:r>
-          </a:p>
-          <a:p>
-            <a:r>
-              <a:rPr lang="en-US" dirty="0"/>
-              <a:t>Requires editing </a:t>
-            </a:r>
-            <a:r>
-              <a:rPr lang="en-US" dirty="0" err="1"/>
-              <a:t>Web.config</a:t>
-            </a:r>
-            <a:r>
-              <a:rPr lang="en-US" dirty="0"/>
-              <a:t> on live site.  Search for word “Shunt” and you’ll see what to do.  Save the change.  Undo it to un-shunt</a:t>
+              <a:t>Eric Berman</a:t>
+            </a:r>
+          </a:p>
+          <a:p>
+            <a:r>
+              <a:rPr lang="en-US" dirty="0"/>
+              <a:t>myflightbook@gmail.com</a:t>
+            </a:r>
+          </a:p>
+          <a:p>
+            <a:r>
+              <a:rPr lang="en-US" dirty="0">
+                <a:hlinkClick r:id="rId2"/>
+              </a:rPr>
+              <a:t>Ericbe_expe@hotmail.com</a:t>
+            </a:r>
+            <a:endParaRPr lang="en-US" dirty="0"/>
+          </a:p>
+          <a:p>
+            <a:r>
+              <a:rPr lang="en-US" dirty="0">
+                <a:hlinkClick r:id="rId3"/>
+              </a:rPr>
+              <a:t>ericbe@hothpark.com</a:t>
+            </a:r>
+            <a:endParaRPr lang="en-US" dirty="0"/>
+          </a:p>
+          <a:p>
+            <a:r>
+              <a:rPr lang="en-US" dirty="0"/>
+              <a:t>425-483-8327 (h)</a:t>
+            </a:r>
+          </a:p>
+          <a:p>
+            <a:r>
+              <a:rPr lang="en-US" dirty="0"/>
+              <a:t>425-765-9873 (c)</a:t>
             </a:r>
           </a:p>
         </p:txBody>
@@ -9971,7 +9985,7 @@
     </p:spTree>
     <p:extLst>
       <p:ext uri="{BB962C8B-B14F-4D97-AF65-F5344CB8AC3E}">
-        <p14:creationId xmlns:p14="http://schemas.microsoft.com/office/powerpoint/2010/main" val="3705413828"/>
+        <p14:creationId xmlns:p14="http://schemas.microsoft.com/office/powerpoint/2010/main" val="2072378181"/>
       </p:ext>
     </p:extLst>
   </p:cSld>
@@ -10000,12 +10014,12 @@
       </p:grpSpPr>
       <p:sp>
         <p:nvSpPr>
-          <p:cNvPr id="2" name="Title 1"/>
-          <p:cNvSpPr>
-            <a:spLocks noGrp="1"/>
-          </p:cNvSpPr>
-          <p:nvPr>
-            <p:ph type="title"/>
+          <p:cNvPr id="4" name="Title 3"/>
+          <p:cNvSpPr>
+            <a:spLocks noGrp="1"/>
+          </p:cNvSpPr>
+          <p:nvPr>
+            <p:ph type="ctrTitle"/>
           </p:nvPr>
         </p:nvSpPr>
         <p:spPr/>
@@ -10015,19 +10029,19 @@
           <a:p>
             <a:r>
               <a:rPr lang="en-US" dirty="0"/>
-              <a:t>My Contact Information</a:t>
-            </a:r>
-          </a:p>
-        </p:txBody>
-      </p:sp>
-      <p:sp>
-        <p:nvSpPr>
-          <p:cNvPr id="3" name="Content Placeholder 2"/>
-          <p:cNvSpPr>
-            <a:spLocks noGrp="1"/>
-          </p:cNvSpPr>
-          <p:nvPr>
-            <p:ph idx="1"/>
+              <a:t>Questions?</a:t>
+            </a:r>
+          </a:p>
+        </p:txBody>
+      </p:sp>
+      <p:sp>
+        <p:nvSpPr>
+          <p:cNvPr id="5" name="Subtitle 4"/>
+          <p:cNvSpPr>
+            <a:spLocks noGrp="1"/>
+          </p:cNvSpPr>
+          <p:nvPr>
+            <p:ph type="subTitle" idx="1"/>
           </p:nvPr>
         </p:nvSpPr>
         <p:spPr/>
@@ -10035,53 +10049,14 @@
           <a:bodyPr/>
           <a:lstStyle/>
           <a:p>
-            <a:r>
-              <a:rPr lang="en-US" dirty="0"/>
-              <a:t>Eric Berman</a:t>
-            </a:r>
-          </a:p>
-          <a:p>
-            <a:r>
-              <a:rPr lang="en-US" dirty="0"/>
-              <a:t>myflightbook@gmail.com</a:t>
-            </a:r>
-          </a:p>
-          <a:p>
-            <a:r>
-              <a:rPr lang="en-US" dirty="0">
-                <a:hlinkClick r:id="rId2"/>
-              </a:rPr>
-              <a:t>Ericbe_expe@hotmail.com</a:t>
-            </a:r>
-            <a:endParaRPr lang="en-US" dirty="0"/>
-          </a:p>
-          <a:p>
-            <a:r>
-              <a:rPr lang="en-US" dirty="0">
-                <a:hlinkClick r:id="rId3"/>
-              </a:rPr>
-              <a:t>ericbe@hothpark.com</a:t>
-            </a:r>
-            <a:endParaRPr lang="en-US" dirty="0"/>
-          </a:p>
-          <a:p>
-            <a:r>
-              <a:rPr lang="en-US" dirty="0"/>
-              <a:t>425-483-8327 (h)</a:t>
-            </a:r>
-          </a:p>
-          <a:p>
-            <a:r>
-              <a:rPr lang="en-US" dirty="0"/>
-              <a:t>425-765-9873 (c)</a:t>
-            </a:r>
+            <a:endParaRPr lang="en-US"/>
           </a:p>
         </p:txBody>
       </p:sp>
     </p:spTree>
     <p:extLst>
       <p:ext uri="{BB962C8B-B14F-4D97-AF65-F5344CB8AC3E}">
-        <p14:creationId xmlns:p14="http://schemas.microsoft.com/office/powerpoint/2010/main" val="2072378181"/>
+        <p14:creationId xmlns:p14="http://schemas.microsoft.com/office/powerpoint/2010/main" val="3409263415"/>
       </p:ext>
     </p:extLst>
   </p:cSld>
@@ -10192,77 +10167,6 @@
     <p:extLst>
       <p:ext uri="{BB962C8B-B14F-4D97-AF65-F5344CB8AC3E}">
         <p14:creationId xmlns:p14="http://schemas.microsoft.com/office/powerpoint/2010/main" val="3499194616"/>
-      </p:ext>
-    </p:extLst>
-  </p:cSld>
-  <p:clrMapOvr>
-    <a:masterClrMapping/>
-  </p:clrMapOvr>
-</p:sld>
-</file>
-
-<file path=ppt/slides/slide40.xml><?xml version="1.0" encoding="utf-8"?>
-<p:sld xmlns:a="http://schemas.openxmlformats.org/drawingml/2006/main" xmlns:r="http://schemas.openxmlformats.org/officeDocument/2006/relationships" xmlns:p="http://schemas.openxmlformats.org/presentationml/2006/main">
-  <p:cSld>
-    <p:spTree>
-      <p:nvGrpSpPr>
-        <p:cNvPr id="1" name=""/>
-        <p:cNvGrpSpPr/>
-        <p:nvPr/>
-      </p:nvGrpSpPr>
-      <p:grpSpPr>
-        <a:xfrm>
-          <a:off x="0" y="0"/>
-          <a:ext cx="0" cy="0"/>
-          <a:chOff x="0" y="0"/>
-          <a:chExt cx="0" cy="0"/>
-        </a:xfrm>
-      </p:grpSpPr>
-      <p:sp>
-        <p:nvSpPr>
-          <p:cNvPr id="4" name="Title 3"/>
-          <p:cNvSpPr>
-            <a:spLocks noGrp="1"/>
-          </p:cNvSpPr>
-          <p:nvPr>
-            <p:ph type="ctrTitle"/>
-          </p:nvPr>
-        </p:nvSpPr>
-        <p:spPr/>
-        <p:txBody>
-          <a:bodyPr/>
-          <a:lstStyle/>
-          <a:p>
-            <a:r>
-              <a:rPr lang="en-US" dirty="0"/>
-              <a:t>Questions?</a:t>
-            </a:r>
-          </a:p>
-        </p:txBody>
-      </p:sp>
-      <p:sp>
-        <p:nvSpPr>
-          <p:cNvPr id="5" name="Subtitle 4"/>
-          <p:cNvSpPr>
-            <a:spLocks noGrp="1"/>
-          </p:cNvSpPr>
-          <p:nvPr>
-            <p:ph type="subTitle" idx="1"/>
-          </p:nvPr>
-        </p:nvSpPr>
-        <p:spPr/>
-        <p:txBody>
-          <a:bodyPr/>
-          <a:lstStyle/>
-          <a:p>
-            <a:endParaRPr lang="en-US"/>
-          </a:p>
-        </p:txBody>
-      </p:sp>
-    </p:spTree>
-    <p:extLst>
-      <p:ext uri="{BB962C8B-B14F-4D97-AF65-F5344CB8AC3E}">
-        <p14:creationId xmlns:p14="http://schemas.microsoft.com/office/powerpoint/2010/main" val="3409263415"/>
       </p:ext>
     </p:extLst>
   </p:cSld>
@@ -10551,7 +10455,7 @@
             </a:r>
             <a:r>
               <a:rPr lang="en-US" dirty="0" err="1"/>
-              <a:t>viewstate</a:t>
+              <a:t>Postback</a:t>
             </a:r>
             <a:r>
               <a:rPr lang="en-US" dirty="0"/>

</xml_diff>